<commit_message>
update week 14 slide
</commit_message>
<xml_diff>
--- a/2019/slides/week14_1.pptx
+++ b/2019/slides/week14_1.pptx
@@ -52,14 +52,14 @@
     <p:sldId id="1075" r:id="rId40"/>
     <p:sldId id="1077" r:id="rId41"/>
     <p:sldId id="1078" r:id="rId42"/>
-    <p:sldId id="1079" r:id="rId43"/>
-    <p:sldId id="1080" r:id="rId44"/>
-    <p:sldId id="1081" r:id="rId45"/>
+    <p:sldId id="1080" r:id="rId43"/>
+    <p:sldId id="1081" r:id="rId44"/>
+    <p:sldId id="1088" r:id="rId45"/>
     <p:sldId id="1069" r:id="rId46"/>
     <p:sldId id="1083" r:id="rId47"/>
     <p:sldId id="1084" r:id="rId48"/>
     <p:sldId id="1085" r:id="rId49"/>
-    <p:sldId id="1086" r:id="rId50"/>
+    <p:sldId id="1089" r:id="rId50"/>
     <p:sldId id="276" r:id="rId51"/>
   </p:sldIdLst>
   <p:sldSz cx="12192000" cy="6858000"/>
@@ -264,7 +264,7 @@
           <a:p>
             <a:fld id="{8CCE4C83-8F64-4E29-91B9-0017BF1F34A9}" type="datetimeFigureOut">
               <a:rPr lang="en-US" smtClean="0"/>
-              <a:t>5/22/2019</a:t>
+              <a:t>5/23/2019</a:t>
             </a:fld>
             <a:endParaRPr lang="en-US" dirty="0"/>
           </a:p>
@@ -441,7 +441,7 @@
           <a:p>
             <a:fld id="{C36A45D3-9EDB-4B35-90F9-382768275B83}" type="datetimeFigureOut">
               <a:rPr lang="en-US" smtClean="0"/>
-              <a:t>5/22/2019</a:t>
+              <a:t>5/23/2019</a:t>
             </a:fld>
             <a:endParaRPr lang="en-US" dirty="0"/>
           </a:p>
@@ -5201,7 +5201,7 @@
             </a:r>
             <a:r>
               <a:rPr lang="en-US" altLang="ja-JP" dirty="0"/>
-              <a:t>11 mod 4</a:t>
+              <a:t>21 mod 4</a:t>
             </a:r>
           </a:p>
           <a:p>
@@ -5246,7 +5246,7 @@
             </a:r>
             <a:r>
               <a:rPr lang="en-US" altLang="ja-JP" dirty="0"/>
-              <a:t>+11</a:t>
+              <a:t>+21</a:t>
             </a:r>
             <a:r>
               <a:rPr lang="zh-TW" altLang="en-US" dirty="0"/>
@@ -5382,7 +5382,7 @@
             </a:r>
             <a:r>
               <a:rPr lang="en-US" altLang="ja-JP" dirty="0"/>
-              <a:t>11 mod 4</a:t>
+              <a:t>21 mod 4</a:t>
             </a:r>
           </a:p>
           <a:p>
@@ -5427,7 +5427,7 @@
             </a:r>
             <a:r>
               <a:rPr lang="en-US" altLang="ja-JP" dirty="0"/>
-              <a:t>+11</a:t>
+              <a:t>+21</a:t>
             </a:r>
             <a:r>
               <a:rPr lang="zh-TW" altLang="en-US" dirty="0"/>
@@ -5473,7 +5473,7 @@
             </a:r>
             <a:r>
               <a:rPr lang="en-US" altLang="ja-JP" dirty="0"/>
-              <a:t>×11</a:t>
+              <a:t>×21</a:t>
             </a:r>
             <a:r>
               <a:rPr lang="zh-TW" altLang="en-US" dirty="0"/>
@@ -5676,8 +5676,20 @@
               <a:t>n </a:t>
             </a:r>
             <a:r>
+              <a:rPr lang="zh-TW" altLang="en-US" b="1" dirty="0"/>
+              <a:t>互質</a:t>
+            </a:r>
+            <a:r>
               <a:rPr lang="zh-TW" altLang="en-US" dirty="0"/>
-              <a:t>互質且小於 </a:t>
+              <a:t>且</a:t>
+            </a:r>
+            <a:r>
+              <a:rPr lang="zh-TW" altLang="en-US" b="1" dirty="0"/>
+              <a:t>小於</a:t>
+            </a:r>
+            <a:r>
+              <a:rPr lang="zh-TW" altLang="en-US" dirty="0"/>
+              <a:t> </a:t>
             </a:r>
             <a:r>
               <a:rPr lang="en-US" altLang="zh-TW" dirty="0"/>
@@ -5685,9 +5697,29 @@
             </a:r>
             <a:r>
               <a:rPr lang="zh-TW" altLang="en-US" dirty="0"/>
-              <a:t>的正整數的個數</a:t>
-            </a:r>
-            <a:endParaRPr lang="en-US" altLang="zh-TW" dirty="0"/>
+              <a:t>的</a:t>
+            </a:r>
+            <a:r>
+              <a:rPr lang="zh-TW" altLang="en-US" b="1" dirty="0"/>
+              <a:t>正</a:t>
+            </a:r>
+            <a:r>
+              <a:rPr lang="zh-TW" altLang="en-US" dirty="0"/>
+              <a:t>整數的</a:t>
+            </a:r>
+            <a:r>
+              <a:rPr lang="zh-TW" altLang="en-US" b="1" dirty="0">
+                <a:solidFill>
+                  <a:srgbClr val="F2A12A"/>
+                </a:solidFill>
+              </a:rPr>
+              <a:t>個數</a:t>
+            </a:r>
+            <a:endParaRPr lang="en-US" altLang="zh-TW" b="1" dirty="0">
+              <a:solidFill>
+                <a:srgbClr val="F2A12A"/>
+              </a:solidFill>
+            </a:endParaRPr>
           </a:p>
           <a:p>
             <a:pPr marL="0" indent="0">
@@ -8001,7 +8033,15 @@
             </a:pPr>
             <a:r>
               <a:rPr kumimoji="1" lang="zh-TW" altLang="en-US" dirty="0"/>
-              <a:t>其中 </a:t>
+              <a:t>留意</a:t>
+            </a:r>
+            <a:r>
+              <a:rPr kumimoji="1" lang="en-US" altLang="zh-TW" dirty="0"/>
+              <a:t>:</a:t>
+            </a:r>
+            <a:r>
+              <a:rPr kumimoji="1" lang="zh-TW" altLang="en-US" dirty="0"/>
+              <a:t> </a:t>
             </a:r>
             <a:r>
               <a:rPr kumimoji="1" lang="en-US" altLang="zh-TW" dirty="0" err="1"/>
@@ -9411,8 +9451,12 @@
           <a:lstStyle/>
           <a:p>
             <a:r>
+              <a:rPr kumimoji="1" lang="zh-TW" altLang="en-US" b="1" dirty="0"/>
+              <a:t>擴展</a:t>
+            </a:r>
+            <a:r>
               <a:rPr kumimoji="1" lang="zh-TW" altLang="en-US" dirty="0"/>
-              <a:t>擴展歐幾里得演算法</a:t>
+              <a:t>歐幾里得演算法</a:t>
             </a:r>
             <a:endParaRPr kumimoji="1" lang="en-US" altLang="ja-JP" dirty="0"/>
           </a:p>
@@ -9850,10 +9894,6 @@
               <a:t>⋅x</a:t>
             </a:r>
             <a:r>
-              <a:rPr kumimoji="1" lang="en-US" altLang="zh-TW" baseline="-25000" dirty="0"/>
-              <a:t>n</a:t>
-            </a:r>
-            <a:r>
               <a:rPr kumimoji="1" lang="zh-TW" altLang="en-US" baseline="-25000" dirty="0"/>
               <a:t> </a:t>
             </a:r>
@@ -9872,10 +9912,6 @@
             <a:r>
               <a:rPr kumimoji="1" lang="en-US" altLang="zh-TW" dirty="0" err="1"/>
               <a:t>⋅y</a:t>
-            </a:r>
-            <a:r>
-              <a:rPr kumimoji="1" lang="en-US" altLang="zh-TW" baseline="-25000" dirty="0" err="1"/>
-              <a:t>n</a:t>
             </a:r>
             <a:r>
               <a:rPr kumimoji="1" lang="zh-TW" altLang="en-US" baseline="-25000" dirty="0"/>
@@ -10927,153 +10963,255 @@
           </a:p>
         </p:txBody>
       </p:sp>
-      <p:sp>
-        <p:nvSpPr>
-          <p:cNvPr id="3" name="內容版面配置區 2">
-            <a:extLst>
-              <a:ext uri="{FF2B5EF4-FFF2-40B4-BE49-F238E27FC236}">
-                <a16:creationId xmlns:a16="http://schemas.microsoft.com/office/drawing/2014/main" id="{F3171F7E-4F6B-4DDA-87B8-0779F10F59F3}"/>
-              </a:ext>
-            </a:extLst>
-          </p:cNvPr>
-          <p:cNvSpPr>
-            <a:spLocks noGrp="1"/>
-          </p:cNvSpPr>
-          <p:nvPr>
-            <p:ph idx="1"/>
-          </p:nvPr>
-        </p:nvSpPr>
-        <p:spPr/>
-        <p:txBody>
-          <a:bodyPr>
-            <a:normAutofit/>
-          </a:bodyPr>
-          <a:lstStyle/>
-          <a:p>
-            <a:pPr marL="0" indent="0">
-              <a:buNone/>
-            </a:pPr>
-            <a:r>
-              <a:rPr kumimoji="1" lang="zh-TW" altLang="en-US" dirty="0"/>
-              <a:t>考慮輾轉相除法，對</a:t>
-            </a:r>
-            <a:r>
-              <a:rPr kumimoji="1" lang="zh-TW" altLang="en-US" b="1" dirty="0"/>
-              <a:t>過程中</a:t>
-            </a:r>
-            <a:r>
-              <a:rPr kumimoji="1" lang="zh-TW" altLang="en-US" dirty="0"/>
-              <a:t>任意 </a:t>
-            </a:r>
-            <a:r>
-              <a:rPr kumimoji="1" lang="en-US" altLang="zh-TW" dirty="0"/>
-              <a:t>a, b </a:t>
-            </a:r>
-            <a:r>
-              <a:rPr kumimoji="1" lang="zh-TW" altLang="en-US" dirty="0"/>
-              <a:t>有</a:t>
-            </a:r>
-            <a:endParaRPr kumimoji="1" lang="en-US" altLang="zh-TW" dirty="0"/>
-          </a:p>
-          <a:p>
-            <a:pPr marL="0" indent="0">
-              <a:buNone/>
-            </a:pPr>
-            <a:endParaRPr kumimoji="1" lang="en-US" altLang="zh-TW" dirty="0"/>
-          </a:p>
-          <a:p>
-            <a:pPr marL="0" indent="0" algn="ctr">
-              <a:buNone/>
-            </a:pPr>
-            <a:r>
-              <a:rPr kumimoji="1" lang="en-US" altLang="zh-TW" dirty="0"/>
-              <a:t>g = (</a:t>
-            </a:r>
-            <a:r>
-              <a:rPr kumimoji="1" lang="en-US" altLang="zh-TW" dirty="0" err="1"/>
-              <a:t>b%a</a:t>
-            </a:r>
-            <a:r>
-              <a:rPr kumimoji="1" lang="en-US" altLang="zh-TW" dirty="0"/>
-              <a:t>) x + a y</a:t>
-            </a:r>
-            <a:br>
-              <a:rPr kumimoji="1" lang="en-US" altLang="zh-TW" dirty="0">
-                <a:solidFill>
-                  <a:schemeClr val="bg1">
-                    <a:lumMod val="65000"/>
-                  </a:schemeClr>
-                </a:solidFill>
-              </a:rPr>
-            </a:br>
-            <a:endParaRPr kumimoji="1" lang="en-US" altLang="zh-TW" dirty="0"/>
-          </a:p>
-          <a:p>
-            <a:pPr marL="0" indent="0" algn="ctr">
-              <a:buNone/>
-            </a:pPr>
-            <a:r>
-              <a:rPr kumimoji="1" lang="en-US" altLang="zh-TW" dirty="0"/>
-              <a:t>g = (b − ⌊b/a⌋⋅a) x + a y</a:t>
-            </a:r>
-          </a:p>
-          <a:p>
-            <a:pPr marL="0" indent="0" algn="ctr">
-              <a:buNone/>
-            </a:pPr>
-            <a:r>
-              <a:rPr kumimoji="1" lang="en-US" altLang="zh-TW" dirty="0">
-                <a:solidFill>
-                  <a:schemeClr val="bg1">
-                    <a:lumMod val="75000"/>
-                  </a:schemeClr>
-                </a:solidFill>
-              </a:rPr>
-              <a:t>(</a:t>
-            </a:r>
-            <a:r>
-              <a:rPr kumimoji="1" lang="en-US" altLang="zh-TW" dirty="0" err="1">
-                <a:solidFill>
-                  <a:schemeClr val="bg1">
-                    <a:lumMod val="75000"/>
-                  </a:schemeClr>
-                </a:solidFill>
-              </a:rPr>
-              <a:t>b%a</a:t>
-            </a:r>
-            <a:r>
-              <a:rPr kumimoji="1" lang="en-US" altLang="zh-TW" dirty="0">
-                <a:solidFill>
-                  <a:schemeClr val="bg1">
-                    <a:lumMod val="75000"/>
-                  </a:schemeClr>
-                </a:solidFill>
-              </a:rPr>
-              <a:t> </a:t>
-            </a:r>
-            <a:r>
-              <a:rPr kumimoji="1" lang="zh-TW" altLang="en-US" dirty="0">
-                <a:solidFill>
-                  <a:schemeClr val="bg1">
-                    <a:lumMod val="75000"/>
-                  </a:schemeClr>
-                </a:solidFill>
-              </a:rPr>
-              <a:t>的定義</a:t>
-            </a:r>
-            <a:r>
-              <a:rPr kumimoji="1" lang="en-US" altLang="zh-TW" dirty="0">
-                <a:solidFill>
-                  <a:schemeClr val="bg1">
-                    <a:lumMod val="75000"/>
-                  </a:schemeClr>
-                </a:solidFill>
-              </a:rPr>
-              <a:t>)</a:t>
-            </a:r>
-          </a:p>
-        </p:txBody>
-      </p:sp>
+      <mc:AlternateContent xmlns:mc="http://schemas.openxmlformats.org/markup-compatibility/2006">
+        <mc:Choice xmlns:a14="http://schemas.microsoft.com/office/drawing/2010/main" Requires="a14">
+          <p:sp>
+            <p:nvSpPr>
+              <p:cNvPr id="3" name="內容版面配置區 2">
+                <a:extLst>
+                  <a:ext uri="{FF2B5EF4-FFF2-40B4-BE49-F238E27FC236}">
+                    <a16:creationId xmlns:a16="http://schemas.microsoft.com/office/drawing/2014/main" id="{F3171F7E-4F6B-4DDA-87B8-0779F10F59F3}"/>
+                  </a:ext>
+                </a:extLst>
+              </p:cNvPr>
+              <p:cNvSpPr>
+                <a:spLocks noGrp="1"/>
+              </p:cNvSpPr>
+              <p:nvPr>
+                <p:ph idx="1"/>
+              </p:nvPr>
+            </p:nvSpPr>
+            <p:spPr/>
+            <p:txBody>
+              <a:bodyPr>
+                <a:normAutofit/>
+              </a:bodyPr>
+              <a:lstStyle/>
+              <a:p>
+                <a:pPr marL="0" indent="0">
+                  <a:buNone/>
+                </a:pPr>
+                <a:r>
+                  <a:rPr kumimoji="1" lang="zh-TW" altLang="en-US" dirty="0"/>
+                  <a:t>考慮輾轉相除法，對</a:t>
+                </a:r>
+                <a:r>
+                  <a:rPr kumimoji="1" lang="zh-TW" altLang="en-US" b="1" dirty="0"/>
+                  <a:t>過程中</a:t>
+                </a:r>
+                <a:r>
+                  <a:rPr kumimoji="1" lang="zh-TW" altLang="en-US" dirty="0"/>
+                  <a:t>任意 </a:t>
+                </a:r>
+                <a:r>
+                  <a:rPr kumimoji="1" lang="en-US" altLang="zh-TW" dirty="0"/>
+                  <a:t>a, b </a:t>
+                </a:r>
+                <a:r>
+                  <a:rPr kumimoji="1" lang="zh-TW" altLang="en-US" dirty="0"/>
+                  <a:t>有</a:t>
+                </a:r>
+                <a:endParaRPr kumimoji="1" lang="en-US" altLang="zh-TW" dirty="0"/>
+              </a:p>
+              <a:p>
+                <a:pPr marL="0" indent="0">
+                  <a:buNone/>
+                </a:pPr>
+                <a:endParaRPr kumimoji="1" lang="en-US" altLang="zh-TW" dirty="0"/>
+              </a:p>
+              <a:p>
+                <a:pPr marL="0" indent="0" algn="ctr">
+                  <a:buNone/>
+                </a:pPr>
+                <a:r>
+                  <a:rPr kumimoji="1" lang="en-US" altLang="zh-TW" dirty="0"/>
+                  <a:t>g = (</a:t>
+                </a:r>
+                <a:r>
+                  <a:rPr kumimoji="1" lang="en-US" altLang="zh-TW" dirty="0" err="1"/>
+                  <a:t>b%a</a:t>
+                </a:r>
+                <a:r>
+                  <a:rPr kumimoji="1" lang="en-US" altLang="zh-TW" dirty="0"/>
+                  <a:t>) x + a y</a:t>
+                </a:r>
+                <a:br>
+                  <a:rPr kumimoji="1" lang="en-US" altLang="zh-TW" dirty="0">
+                    <a:solidFill>
+                      <a:schemeClr val="bg1">
+                        <a:lumMod val="65000"/>
+                      </a:schemeClr>
+                    </a:solidFill>
+                  </a:rPr>
+                </a:br>
+                <a:endParaRPr kumimoji="1" lang="en-US" altLang="zh-TW" dirty="0"/>
+              </a:p>
+              <a:p>
+                <a:pPr marL="0" indent="0" algn="ctr">
+                  <a:buNone/>
+                </a:pPr>
+                <a:r>
+                  <a:rPr kumimoji="1" lang="en-US" altLang="zh-TW" dirty="0"/>
+                  <a:t>g = (b − </a:t>
+                </a:r>
+                <a14:m>
+                  <m:oMath xmlns:m="http://schemas.openxmlformats.org/officeDocument/2006/math">
+                    <m:d>
+                      <m:dPr>
+                        <m:begChr m:val="⌊"/>
+                        <m:endChr m:val="⌋"/>
+                        <m:ctrlPr>
+                          <a:rPr kumimoji="1" lang="en-US" altLang="zh-TW" i="1" dirty="0">
+                            <a:latin typeface="Cambria Math" panose="02040503050406030204" pitchFamily="18" charset="0"/>
+                          </a:rPr>
+                        </m:ctrlPr>
+                      </m:dPr>
+                      <m:e>
+                        <m:f>
+                          <m:fPr>
+                            <m:ctrlPr>
+                              <a:rPr kumimoji="1" lang="en-US" altLang="zh-TW" i="1" dirty="0">
+                                <a:latin typeface="Cambria Math" panose="02040503050406030204" pitchFamily="18" charset="0"/>
+                              </a:rPr>
+                            </m:ctrlPr>
+                          </m:fPr>
+                          <m:num>
+                            <m:r>
+                              <m:rPr>
+                                <m:sty m:val="p"/>
+                              </m:rPr>
+                              <a:rPr kumimoji="1" lang="en-US" altLang="zh-TW" dirty="0">
+                                <a:latin typeface="Cambria Math" panose="02040503050406030204" pitchFamily="18" charset="0"/>
+                              </a:rPr>
+                              <m:t>b</m:t>
+                            </m:r>
+                          </m:num>
+                          <m:den>
+                            <m:r>
+                              <m:rPr>
+                                <m:sty m:val="p"/>
+                              </m:rPr>
+                              <a:rPr kumimoji="1" lang="en-US" altLang="zh-TW" dirty="0">
+                                <a:latin typeface="Cambria Math" panose="02040503050406030204" pitchFamily="18" charset="0"/>
+                              </a:rPr>
+                              <m:t>a</m:t>
+                            </m:r>
+                          </m:den>
+                        </m:f>
+                      </m:e>
+                    </m:d>
+                    <m:r>
+                      <m:rPr>
+                        <m:nor/>
+                      </m:rPr>
+                      <a:rPr kumimoji="1" lang="en-US" altLang="zh-TW" dirty="0"/>
+                      <m:t>⋅</m:t>
+                    </m:r>
+                  </m:oMath>
+                </a14:m>
+                <a:r>
+                  <a:rPr kumimoji="1" lang="en-US" altLang="zh-TW" dirty="0"/>
+                  <a:t>a) x + a y</a:t>
+                </a:r>
+              </a:p>
+              <a:p>
+                <a:pPr marL="0" indent="0" algn="ctr">
+                  <a:buNone/>
+                </a:pPr>
+                <a:r>
+                  <a:rPr kumimoji="1" lang="en-US" altLang="zh-TW" dirty="0">
+                    <a:solidFill>
+                      <a:schemeClr val="bg1">
+                        <a:lumMod val="75000"/>
+                      </a:schemeClr>
+                    </a:solidFill>
+                  </a:rPr>
+                  <a:t>(</a:t>
+                </a:r>
+                <a:r>
+                  <a:rPr kumimoji="1" lang="en-US" altLang="zh-TW" dirty="0" err="1">
+                    <a:solidFill>
+                      <a:schemeClr val="bg1">
+                        <a:lumMod val="75000"/>
+                      </a:schemeClr>
+                    </a:solidFill>
+                  </a:rPr>
+                  <a:t>b%a</a:t>
+                </a:r>
+                <a:r>
+                  <a:rPr kumimoji="1" lang="en-US" altLang="zh-TW" dirty="0">
+                    <a:solidFill>
+                      <a:schemeClr val="bg1">
+                        <a:lumMod val="75000"/>
+                      </a:schemeClr>
+                    </a:solidFill>
+                  </a:rPr>
+                  <a:t> </a:t>
+                </a:r>
+                <a:r>
+                  <a:rPr kumimoji="1" lang="zh-TW" altLang="en-US" dirty="0">
+                    <a:solidFill>
+                      <a:schemeClr val="bg1">
+                        <a:lumMod val="75000"/>
+                      </a:schemeClr>
+                    </a:solidFill>
+                  </a:rPr>
+                  <a:t>的定義</a:t>
+                </a:r>
+                <a:r>
+                  <a:rPr kumimoji="1" lang="en-US" altLang="zh-TW" dirty="0">
+                    <a:solidFill>
+                      <a:schemeClr val="bg1">
+                        <a:lumMod val="75000"/>
+                      </a:schemeClr>
+                    </a:solidFill>
+                  </a:rPr>
+                  <a:t>)</a:t>
+                </a:r>
+              </a:p>
+            </p:txBody>
+          </p:sp>
+        </mc:Choice>
+        <mc:Fallback>
+          <p:sp>
+            <p:nvSpPr>
+              <p:cNvPr id="3" name="內容版面配置區 2">
+                <a:extLst>
+                  <a:ext uri="{FF2B5EF4-FFF2-40B4-BE49-F238E27FC236}">
+                    <a16:creationId xmlns:a16="http://schemas.microsoft.com/office/drawing/2014/main" id="{F3171F7E-4F6B-4DDA-87B8-0779F10F59F3}"/>
+                  </a:ext>
+                </a:extLst>
+              </p:cNvPr>
+              <p:cNvSpPr>
+                <a:spLocks noGrp="1" noRot="1" noChangeAspect="1" noMove="1" noResize="1" noEditPoints="1" noAdjustHandles="1" noChangeArrowheads="1" noChangeShapeType="1" noTextEdit="1"/>
+              </p:cNvSpPr>
+              <p:nvPr>
+                <p:ph idx="1"/>
+              </p:nvPr>
+            </p:nvSpPr>
+            <p:spPr>
+              <a:blipFill>
+                <a:blip r:embed="rId2"/>
+                <a:stretch>
+                  <a:fillRect l="-1797" t="-3361"/>
+                </a:stretch>
+              </a:blipFill>
+            </p:spPr>
+            <p:txBody>
+              <a:bodyPr/>
+              <a:lstStyle/>
+              <a:p>
+                <a:r>
+                  <a:rPr lang="ja-JP" altLang="en-US">
+                    <a:noFill/>
+                  </a:rPr>
+                  <a:t> </a:t>
+                </a:r>
+              </a:p>
+            </p:txBody>
+          </p:sp>
+        </mc:Fallback>
+      </mc:AlternateContent>
       <p:sp>
         <p:nvSpPr>
           <p:cNvPr id="4" name="箭號: 向右 3">
@@ -11088,7 +11226,7 @@
         </p:nvSpPr>
         <p:spPr>
           <a:xfrm>
-            <a:off x="923261" y="4250994"/>
+            <a:off x="923261" y="4378590"/>
             <a:ext cx="1830572" cy="531627"/>
           </a:xfrm>
           <a:prstGeom prst="rightArrow">
@@ -11179,134 +11317,295 @@
           </a:p>
         </p:txBody>
       </p:sp>
-      <p:sp>
-        <p:nvSpPr>
-          <p:cNvPr id="3" name="內容版面配置區 2">
-            <a:extLst>
-              <a:ext uri="{FF2B5EF4-FFF2-40B4-BE49-F238E27FC236}">
-                <a16:creationId xmlns:a16="http://schemas.microsoft.com/office/drawing/2014/main" id="{F3171F7E-4F6B-4DDA-87B8-0779F10F59F3}"/>
-              </a:ext>
-            </a:extLst>
-          </p:cNvPr>
-          <p:cNvSpPr>
-            <a:spLocks noGrp="1"/>
-          </p:cNvSpPr>
-          <p:nvPr>
-            <p:ph idx="1"/>
-          </p:nvPr>
-        </p:nvSpPr>
-        <p:spPr/>
-        <p:txBody>
-          <a:bodyPr>
-            <a:normAutofit/>
-          </a:bodyPr>
-          <a:lstStyle/>
-          <a:p>
-            <a:pPr marL="0" indent="0">
-              <a:buNone/>
-            </a:pPr>
-            <a:r>
-              <a:rPr kumimoji="1" lang="zh-TW" altLang="en-US" dirty="0"/>
-              <a:t>考慮輾轉相除法，對</a:t>
-            </a:r>
-            <a:r>
-              <a:rPr kumimoji="1" lang="zh-TW" altLang="en-US" b="1" dirty="0"/>
-              <a:t>過程中</a:t>
-            </a:r>
-            <a:r>
-              <a:rPr kumimoji="1" lang="zh-TW" altLang="en-US" dirty="0"/>
-              <a:t>任意 </a:t>
-            </a:r>
-            <a:r>
-              <a:rPr kumimoji="1" lang="en-US" altLang="zh-TW" dirty="0"/>
-              <a:t>a, b </a:t>
-            </a:r>
-            <a:r>
-              <a:rPr kumimoji="1" lang="zh-TW" altLang="en-US" dirty="0"/>
-              <a:t>有</a:t>
-            </a:r>
-            <a:endParaRPr kumimoji="1" lang="en-US" altLang="zh-TW" dirty="0"/>
-          </a:p>
-          <a:p>
-            <a:pPr marL="0" indent="0">
-              <a:buNone/>
-            </a:pPr>
-            <a:endParaRPr kumimoji="1" lang="en-US" altLang="zh-TW" dirty="0">
-              <a:solidFill>
-                <a:schemeClr val="bg1">
-                  <a:lumMod val="65000"/>
-                </a:schemeClr>
-              </a:solidFill>
-            </a:endParaRPr>
-          </a:p>
-          <a:p>
-            <a:pPr marL="0" indent="0" algn="ctr">
-              <a:buNone/>
-            </a:pPr>
-            <a:r>
-              <a:rPr kumimoji="1" lang="en-US" altLang="zh-TW" dirty="0"/>
-              <a:t>g = (b − ⌊b/a⌋⋅a) x + a y</a:t>
-            </a:r>
-            <a:endParaRPr kumimoji="1" lang="en-US" altLang="zh-TW" dirty="0">
-              <a:solidFill>
-                <a:schemeClr val="bg1">
-                  <a:lumMod val="65000"/>
-                </a:schemeClr>
-              </a:solidFill>
-            </a:endParaRPr>
-          </a:p>
-          <a:p>
-            <a:pPr marL="0" indent="0" algn="ctr">
-              <a:buNone/>
-            </a:pPr>
-            <a:endParaRPr kumimoji="1" lang="en-US" altLang="zh-TW" dirty="0"/>
-          </a:p>
-          <a:p>
-            <a:pPr marL="0" indent="0" algn="ctr">
-              <a:buNone/>
-            </a:pPr>
-            <a:r>
-              <a:rPr kumimoji="1" lang="en-US" altLang="zh-TW" dirty="0"/>
-              <a:t>g = b x + a (y − ⌊b/a⌋⋅x)</a:t>
-            </a:r>
-          </a:p>
-          <a:p>
-            <a:pPr marL="0" indent="0" algn="ctr">
-              <a:buNone/>
-            </a:pPr>
-            <a:r>
-              <a:rPr kumimoji="1" lang="en-US" altLang="zh-TW" dirty="0">
-                <a:solidFill>
-                  <a:schemeClr val="bg1">
-                    <a:lumMod val="75000"/>
-                  </a:schemeClr>
-                </a:solidFill>
-              </a:rPr>
-              <a:t>(</a:t>
-            </a:r>
-            <a:r>
-              <a:rPr kumimoji="1" lang="zh-TW" altLang="en-US" dirty="0">
-                <a:solidFill>
-                  <a:schemeClr val="bg1">
-                    <a:lumMod val="75000"/>
-                  </a:schemeClr>
-                </a:solidFill>
-              </a:rPr>
-              <a:t>移個項</a:t>
-            </a:r>
-            <a:r>
-              <a:rPr kumimoji="1" lang="en-US" altLang="zh-TW" dirty="0">
-                <a:solidFill>
-                  <a:schemeClr val="bg1">
-                    <a:lumMod val="75000"/>
-                  </a:schemeClr>
-                </a:solidFill>
-              </a:rPr>
-              <a:t>)</a:t>
-            </a:r>
-          </a:p>
-        </p:txBody>
-      </p:sp>
+      <mc:AlternateContent xmlns:mc="http://schemas.openxmlformats.org/markup-compatibility/2006">
+        <mc:Choice xmlns:a14="http://schemas.microsoft.com/office/drawing/2010/main" Requires="a14">
+          <p:sp>
+            <p:nvSpPr>
+              <p:cNvPr id="3" name="內容版面配置區 2">
+                <a:extLst>
+                  <a:ext uri="{FF2B5EF4-FFF2-40B4-BE49-F238E27FC236}">
+                    <a16:creationId xmlns:a16="http://schemas.microsoft.com/office/drawing/2014/main" id="{F3171F7E-4F6B-4DDA-87B8-0779F10F59F3}"/>
+                  </a:ext>
+                </a:extLst>
+              </p:cNvPr>
+              <p:cNvSpPr>
+                <a:spLocks noGrp="1"/>
+              </p:cNvSpPr>
+              <p:nvPr>
+                <p:ph idx="1"/>
+              </p:nvPr>
+            </p:nvSpPr>
+            <p:spPr/>
+            <p:txBody>
+              <a:bodyPr>
+                <a:normAutofit/>
+              </a:bodyPr>
+              <a:lstStyle/>
+              <a:p>
+                <a:pPr marL="0" indent="0">
+                  <a:buNone/>
+                </a:pPr>
+                <a:r>
+                  <a:rPr kumimoji="1" lang="zh-TW" altLang="en-US" dirty="0"/>
+                  <a:t>考慮輾轉相除法，對</a:t>
+                </a:r>
+                <a:r>
+                  <a:rPr kumimoji="1" lang="zh-TW" altLang="en-US" b="1" dirty="0"/>
+                  <a:t>過程中</a:t>
+                </a:r>
+                <a:r>
+                  <a:rPr kumimoji="1" lang="zh-TW" altLang="en-US" dirty="0"/>
+                  <a:t>任意 </a:t>
+                </a:r>
+                <a:r>
+                  <a:rPr kumimoji="1" lang="en-US" altLang="zh-TW" dirty="0"/>
+                  <a:t>a, b </a:t>
+                </a:r>
+                <a:r>
+                  <a:rPr kumimoji="1" lang="zh-TW" altLang="en-US" dirty="0"/>
+                  <a:t>有</a:t>
+                </a:r>
+                <a:endParaRPr kumimoji="1" lang="en-US" altLang="zh-TW" dirty="0"/>
+              </a:p>
+              <a:p>
+                <a:pPr marL="0" indent="0" algn="ctr">
+                  <a:buNone/>
+                </a:pPr>
+                <a:endParaRPr kumimoji="1" lang="en-US" altLang="zh-TW" dirty="0">
+                  <a:solidFill>
+                    <a:schemeClr val="bg1">
+                      <a:lumMod val="65000"/>
+                    </a:schemeClr>
+                  </a:solidFill>
+                </a:endParaRPr>
+              </a:p>
+              <a:p>
+                <a:pPr marL="0" indent="0" algn="ctr">
+                  <a:buNone/>
+                </a:pPr>
+                <a:r>
+                  <a:rPr kumimoji="1" lang="en-US" altLang="zh-TW" dirty="0"/>
+                  <a:t>g = (b − </a:t>
+                </a:r>
+                <a14:m>
+                  <m:oMath xmlns:m="http://schemas.openxmlformats.org/officeDocument/2006/math">
+                    <m:d>
+                      <m:dPr>
+                        <m:begChr m:val="⌊"/>
+                        <m:endChr m:val="⌋"/>
+                        <m:ctrlPr>
+                          <a:rPr kumimoji="1" lang="en-US" altLang="zh-TW" i="1" dirty="0">
+                            <a:latin typeface="Cambria Math" panose="02040503050406030204" pitchFamily="18" charset="0"/>
+                          </a:rPr>
+                        </m:ctrlPr>
+                      </m:dPr>
+                      <m:e>
+                        <m:f>
+                          <m:fPr>
+                            <m:ctrlPr>
+                              <a:rPr kumimoji="1" lang="en-US" altLang="zh-TW" i="1" dirty="0">
+                                <a:latin typeface="Cambria Math" panose="02040503050406030204" pitchFamily="18" charset="0"/>
+                              </a:rPr>
+                            </m:ctrlPr>
+                          </m:fPr>
+                          <m:num>
+                            <m:r>
+                              <m:rPr>
+                                <m:sty m:val="p"/>
+                              </m:rPr>
+                              <a:rPr kumimoji="1" lang="en-US" altLang="zh-TW" dirty="0">
+                                <a:latin typeface="Cambria Math" panose="02040503050406030204" pitchFamily="18" charset="0"/>
+                              </a:rPr>
+                              <m:t>b</m:t>
+                            </m:r>
+                          </m:num>
+                          <m:den>
+                            <m:r>
+                              <m:rPr>
+                                <m:sty m:val="p"/>
+                              </m:rPr>
+                              <a:rPr kumimoji="1" lang="en-US" altLang="zh-TW" dirty="0">
+                                <a:latin typeface="Cambria Math" panose="02040503050406030204" pitchFamily="18" charset="0"/>
+                              </a:rPr>
+                              <m:t>a</m:t>
+                            </m:r>
+                          </m:den>
+                        </m:f>
+                      </m:e>
+                    </m:d>
+                    <m:r>
+                      <m:rPr>
+                        <m:nor/>
+                      </m:rPr>
+                      <a:rPr kumimoji="1" lang="en-US" altLang="zh-TW" dirty="0"/>
+                      <m:t>⋅</m:t>
+                    </m:r>
+                  </m:oMath>
+                </a14:m>
+                <a:r>
+                  <a:rPr kumimoji="1" lang="en-US" altLang="zh-TW" dirty="0"/>
+                  <a:t>a) x + a y</a:t>
+                </a:r>
+                <a:endParaRPr kumimoji="1" lang="en-US" altLang="zh-TW" dirty="0">
+                  <a:solidFill>
+                    <a:schemeClr val="bg1">
+                      <a:lumMod val="65000"/>
+                    </a:schemeClr>
+                  </a:solidFill>
+                </a:endParaRPr>
+              </a:p>
+              <a:p>
+                <a:pPr marL="0" indent="0" algn="ctr">
+                  <a:buNone/>
+                </a:pPr>
+                <a:endParaRPr kumimoji="1" lang="en-US" altLang="zh-TW" dirty="0"/>
+              </a:p>
+              <a:p>
+                <a:pPr marL="0" indent="0" algn="ctr">
+                  <a:buNone/>
+                </a:pPr>
+                <a:r>
+                  <a:rPr kumimoji="1" lang="en-US" altLang="zh-TW" dirty="0"/>
+                  <a:t>g = b x + a (y − </a:t>
+                </a:r>
+                <a14:m>
+                  <m:oMath xmlns:m="http://schemas.openxmlformats.org/officeDocument/2006/math">
+                    <m:d>
+                      <m:dPr>
+                        <m:begChr m:val="⌊"/>
+                        <m:endChr m:val="⌋"/>
+                        <m:ctrlPr>
+                          <a:rPr kumimoji="1" lang="en-US" altLang="zh-TW" i="1" dirty="0">
+                            <a:latin typeface="Cambria Math" panose="02040503050406030204" pitchFamily="18" charset="0"/>
+                          </a:rPr>
+                        </m:ctrlPr>
+                      </m:dPr>
+                      <m:e>
+                        <m:f>
+                          <m:fPr>
+                            <m:ctrlPr>
+                              <a:rPr kumimoji="1" lang="en-US" altLang="zh-TW" i="1" dirty="0">
+                                <a:latin typeface="Cambria Math" panose="02040503050406030204" pitchFamily="18" charset="0"/>
+                              </a:rPr>
+                            </m:ctrlPr>
+                          </m:fPr>
+                          <m:num>
+                            <m:r>
+                              <m:rPr>
+                                <m:sty m:val="p"/>
+                              </m:rPr>
+                              <a:rPr kumimoji="1" lang="en-US" altLang="zh-TW" dirty="0">
+                                <a:latin typeface="Cambria Math" panose="02040503050406030204" pitchFamily="18" charset="0"/>
+                              </a:rPr>
+                              <m:t>b</m:t>
+                            </m:r>
+                          </m:num>
+                          <m:den>
+                            <m:r>
+                              <m:rPr>
+                                <m:sty m:val="p"/>
+                              </m:rPr>
+                              <a:rPr kumimoji="1" lang="en-US" altLang="zh-TW" dirty="0">
+                                <a:latin typeface="Cambria Math" panose="02040503050406030204" pitchFamily="18" charset="0"/>
+                              </a:rPr>
+                              <m:t>a</m:t>
+                            </m:r>
+                          </m:den>
+                        </m:f>
+                      </m:e>
+                    </m:d>
+                    <m:r>
+                      <m:rPr>
+                        <m:nor/>
+                      </m:rPr>
+                      <a:rPr kumimoji="1" lang="en-US" altLang="zh-TW" dirty="0"/>
+                      <m:t>⋅</m:t>
+                    </m:r>
+                  </m:oMath>
+                </a14:m>
+                <a:r>
+                  <a:rPr kumimoji="1" lang="en-US" altLang="zh-TW" dirty="0"/>
+                  <a:t>x)</a:t>
+                </a:r>
+              </a:p>
+              <a:p>
+                <a:pPr marL="0" indent="0" algn="ctr">
+                  <a:buNone/>
+                </a:pPr>
+                <a:r>
+                  <a:rPr kumimoji="1" lang="en-US" altLang="zh-TW" dirty="0">
+                    <a:solidFill>
+                      <a:schemeClr val="bg1">
+                        <a:lumMod val="75000"/>
+                      </a:schemeClr>
+                    </a:solidFill>
+                  </a:rPr>
+                  <a:t>(</a:t>
+                </a:r>
+                <a:r>
+                  <a:rPr kumimoji="1" lang="zh-TW" altLang="en-US" dirty="0">
+                    <a:solidFill>
+                      <a:schemeClr val="bg1">
+                        <a:lumMod val="75000"/>
+                      </a:schemeClr>
+                    </a:solidFill>
+                  </a:rPr>
+                  <a:t>乘開、移個項</a:t>
+                </a:r>
+                <a:r>
+                  <a:rPr kumimoji="1" lang="en-US" altLang="zh-TW" dirty="0">
+                    <a:solidFill>
+                      <a:schemeClr val="bg1">
+                        <a:lumMod val="75000"/>
+                      </a:schemeClr>
+                    </a:solidFill>
+                  </a:rPr>
+                  <a:t>)</a:t>
+                </a:r>
+              </a:p>
+            </p:txBody>
+          </p:sp>
+        </mc:Choice>
+        <mc:Fallback>
+          <p:sp>
+            <p:nvSpPr>
+              <p:cNvPr id="3" name="內容版面配置區 2">
+                <a:extLst>
+                  <a:ext uri="{FF2B5EF4-FFF2-40B4-BE49-F238E27FC236}">
+                    <a16:creationId xmlns:a16="http://schemas.microsoft.com/office/drawing/2014/main" id="{F3171F7E-4F6B-4DDA-87B8-0779F10F59F3}"/>
+                  </a:ext>
+                </a:extLst>
+              </p:cNvPr>
+              <p:cNvSpPr>
+                <a:spLocks noGrp="1" noRot="1" noChangeAspect="1" noMove="1" noResize="1" noEditPoints="1" noAdjustHandles="1" noChangeArrowheads="1" noChangeShapeType="1" noTextEdit="1"/>
+              </p:cNvSpPr>
+              <p:nvPr>
+                <p:ph idx="1"/>
+              </p:nvPr>
+            </p:nvSpPr>
+            <p:spPr>
+              <a:blipFill>
+                <a:blip r:embed="rId2"/>
+                <a:stretch>
+                  <a:fillRect l="-1797" t="-3361" b="-1120"/>
+                </a:stretch>
+              </a:blipFill>
+            </p:spPr>
+            <p:txBody>
+              <a:bodyPr/>
+              <a:lstStyle/>
+              <a:p>
+                <a:r>
+                  <a:rPr lang="ja-JP" altLang="en-US">
+                    <a:noFill/>
+                  </a:rPr>
+                  <a:t> </a:t>
+                </a:r>
+              </a:p>
+            </p:txBody>
+          </p:sp>
+        </mc:Fallback>
+      </mc:AlternateContent>
       <p:sp>
         <p:nvSpPr>
           <p:cNvPr id="4" name="箭號: 向右 3">
@@ -11321,7 +11620,7 @@
         </p:nvSpPr>
         <p:spPr>
           <a:xfrm>
-            <a:off x="923261" y="4378590"/>
+            <a:off x="923261" y="4740098"/>
             <a:ext cx="1830572" cy="531627"/>
           </a:xfrm>
           <a:prstGeom prst="rightArrow">
@@ -11412,113 +11711,492 @@
           </a:p>
         </p:txBody>
       </p:sp>
+      <mc:AlternateContent xmlns:mc="http://schemas.openxmlformats.org/markup-compatibility/2006">
+        <mc:Choice xmlns:a14="http://schemas.microsoft.com/office/drawing/2010/main" Requires="a14">
+          <p:sp>
+            <p:nvSpPr>
+              <p:cNvPr id="3" name="內容版面配置區 2">
+                <a:extLst>
+                  <a:ext uri="{FF2B5EF4-FFF2-40B4-BE49-F238E27FC236}">
+                    <a16:creationId xmlns:a16="http://schemas.microsoft.com/office/drawing/2014/main" id="{F3171F7E-4F6B-4DDA-87B8-0779F10F59F3}"/>
+                  </a:ext>
+                </a:extLst>
+              </p:cNvPr>
+              <p:cNvSpPr>
+                <a:spLocks noGrp="1"/>
+              </p:cNvSpPr>
+              <p:nvPr>
+                <p:ph idx="1"/>
+              </p:nvPr>
+            </p:nvSpPr>
+            <p:spPr/>
+            <p:txBody>
+              <a:bodyPr>
+                <a:normAutofit lnSpcReduction="10000"/>
+              </a:bodyPr>
+              <a:lstStyle/>
+              <a:p>
+                <a:pPr marL="0" indent="0">
+                  <a:buNone/>
+                </a:pPr>
+                <a:r>
+                  <a:rPr kumimoji="1" lang="zh-TW" altLang="en-US" dirty="0"/>
+                  <a:t>考慮輾轉相除法，對</a:t>
+                </a:r>
+                <a:r>
+                  <a:rPr kumimoji="1" lang="zh-TW" altLang="en-US" b="1" dirty="0"/>
+                  <a:t>過程中</a:t>
+                </a:r>
+                <a:r>
+                  <a:rPr kumimoji="1" lang="zh-TW" altLang="en-US" dirty="0"/>
+                  <a:t>任意 </a:t>
+                </a:r>
+                <a:r>
+                  <a:rPr kumimoji="1" lang="en-US" altLang="zh-TW" dirty="0"/>
+                  <a:t>a, b </a:t>
+                </a:r>
+                <a:r>
+                  <a:rPr kumimoji="1" lang="zh-TW" altLang="en-US" dirty="0"/>
+                  <a:t>有</a:t>
+                </a:r>
+                <a:endParaRPr kumimoji="1" lang="en-US" altLang="zh-TW" dirty="0">
+                  <a:solidFill>
+                    <a:schemeClr val="bg1">
+                      <a:lumMod val="65000"/>
+                    </a:schemeClr>
+                  </a:solidFill>
+                </a:endParaRPr>
+              </a:p>
+              <a:p>
+                <a:pPr marL="0" indent="0">
+                  <a:buNone/>
+                </a:pPr>
+                <a:endParaRPr kumimoji="1" lang="en-US" altLang="zh-TW" dirty="0"/>
+              </a:p>
+              <a:p>
+                <a:pPr marL="0" indent="0" algn="ctr">
+                  <a:buNone/>
+                </a:pPr>
+                <a:r>
+                  <a:rPr kumimoji="1" lang="en-US" altLang="zh-TW" dirty="0"/>
+                  <a:t>g = b x + a (y − </a:t>
+                </a:r>
+                <a14:m>
+                  <m:oMath xmlns:m="http://schemas.openxmlformats.org/officeDocument/2006/math">
+                    <m:d>
+                      <m:dPr>
+                        <m:begChr m:val="⌊"/>
+                        <m:endChr m:val="⌋"/>
+                        <m:ctrlPr>
+                          <a:rPr kumimoji="1" lang="en-US" altLang="zh-TW" i="1" dirty="0">
+                            <a:latin typeface="Cambria Math" panose="02040503050406030204" pitchFamily="18" charset="0"/>
+                          </a:rPr>
+                        </m:ctrlPr>
+                      </m:dPr>
+                      <m:e>
+                        <m:f>
+                          <m:fPr>
+                            <m:ctrlPr>
+                              <a:rPr kumimoji="1" lang="en-US" altLang="zh-TW" i="1" dirty="0">
+                                <a:latin typeface="Cambria Math" panose="02040503050406030204" pitchFamily="18" charset="0"/>
+                              </a:rPr>
+                            </m:ctrlPr>
+                          </m:fPr>
+                          <m:num>
+                            <m:r>
+                              <m:rPr>
+                                <m:sty m:val="p"/>
+                              </m:rPr>
+                              <a:rPr kumimoji="1" lang="en-US" altLang="zh-TW" dirty="0">
+                                <a:latin typeface="Cambria Math" panose="02040503050406030204" pitchFamily="18" charset="0"/>
+                              </a:rPr>
+                              <m:t>b</m:t>
+                            </m:r>
+                          </m:num>
+                          <m:den>
+                            <m:r>
+                              <m:rPr>
+                                <m:sty m:val="p"/>
+                              </m:rPr>
+                              <a:rPr kumimoji="1" lang="en-US" altLang="zh-TW" dirty="0">
+                                <a:latin typeface="Cambria Math" panose="02040503050406030204" pitchFamily="18" charset="0"/>
+                              </a:rPr>
+                              <m:t>a</m:t>
+                            </m:r>
+                          </m:den>
+                        </m:f>
+                      </m:e>
+                    </m:d>
+                    <m:r>
+                      <m:rPr>
+                        <m:nor/>
+                      </m:rPr>
+                      <a:rPr kumimoji="1" lang="en-US" altLang="zh-TW" dirty="0"/>
+                      <m:t>⋅</m:t>
+                    </m:r>
+                  </m:oMath>
+                </a14:m>
+                <a:r>
+                  <a:rPr kumimoji="1" lang="en-US" altLang="zh-TW" dirty="0"/>
+                  <a:t>x)</a:t>
+                </a:r>
+              </a:p>
+              <a:p>
+                <a:pPr marL="0" indent="0">
+                  <a:buNone/>
+                </a:pPr>
+                <a:endParaRPr kumimoji="1" lang="en-US" altLang="zh-TW" dirty="0"/>
+              </a:p>
+              <a:p>
+                <a:pPr marL="0" indent="0" algn="ctr">
+                  <a:buNone/>
+                </a:pPr>
+                <a:r>
+                  <a:rPr kumimoji="1" lang="zh-TW" altLang="en-US" dirty="0"/>
+                  <a:t>令 </a:t>
+                </a:r>
+                <a14:m>
+                  <m:oMath xmlns:m="http://schemas.openxmlformats.org/officeDocument/2006/math">
+                    <m:r>
+                      <a:rPr kumimoji="1" lang="zh-TW" altLang="en-US" i="1" dirty="0">
+                        <a:latin typeface="Cambria Math" panose="02040503050406030204" pitchFamily="18" charset="0"/>
+                      </a:rPr>
+                      <m:t> </m:t>
+                    </m:r>
+                    <m:r>
+                      <a:rPr kumimoji="1" lang="zh-TW" altLang="en-US" i="1" dirty="0" smtClean="0">
+                        <a:latin typeface="Cambria Math" panose="02040503050406030204" pitchFamily="18" charset="0"/>
+                      </a:rPr>
+                      <m:t> </m:t>
+                    </m:r>
+                    <m:r>
+                      <a:rPr kumimoji="1" lang="zh-TW" altLang="en-US" i="1" dirty="0">
+                        <a:latin typeface="Cambria Math" panose="02040503050406030204" pitchFamily="18" charset="0"/>
+                      </a:rPr>
+                      <m:t> </m:t>
+                    </m:r>
+                    <m:r>
+                      <a:rPr kumimoji="1" lang="zh-TW" altLang="en-US" i="1" smtClean="0">
+                        <a:latin typeface="Cambria Math" panose="02040503050406030204" pitchFamily="18" charset="0"/>
+                      </a:rPr>
+                      <m:t> </m:t>
+                    </m:r>
+                    <m:d>
+                      <m:dPr>
+                        <m:begChr m:val="{"/>
+                        <m:endChr m:val=""/>
+                        <m:ctrlPr>
+                          <a:rPr kumimoji="1" lang="en-US" altLang="zh-TW" smtClean="0">
+                            <a:latin typeface="Cambria Math" panose="02040503050406030204" pitchFamily="18" charset="0"/>
+                          </a:rPr>
+                        </m:ctrlPr>
+                      </m:dPr>
+                      <m:e>
+                        <m:m>
+                          <m:mPr>
+                            <m:plcHide m:val="on"/>
+                            <m:mcs>
+                              <m:mc>
+                                <m:mcPr>
+                                  <m:count m:val="1"/>
+                                  <m:mcJc m:val="center"/>
+                                </m:mcPr>
+                              </m:mc>
+                            </m:mcs>
+                            <m:ctrlPr>
+                              <a:rPr kumimoji="1" lang="en-US" altLang="zh-TW" i="1" smtClean="0">
+                                <a:latin typeface="Cambria Math" panose="02040503050406030204" pitchFamily="18" charset="0"/>
+                              </a:rPr>
+                            </m:ctrlPr>
+                          </m:mPr>
+                          <m:mr>
+                            <m:e>
+                              <m:eqArr>
+                                <m:eqArrPr>
+                                  <m:ctrlPr>
+                                    <a:rPr kumimoji="1" lang="en-US" altLang="zh-TW" i="1" smtClean="0">
+                                      <a:latin typeface="Cambria Math" panose="02040503050406030204" pitchFamily="18" charset="0"/>
+                                    </a:rPr>
+                                  </m:ctrlPr>
+                                </m:eqArrPr>
+                                <m:e>
+                                  <m:r>
+                                    <a:rPr kumimoji="1" lang="en-US" altLang="zh-TW" i="1">
+                                      <a:latin typeface="Cambria Math" panose="02040503050406030204" pitchFamily="18" charset="0"/>
+                                    </a:rPr>
+                                    <m:t>&amp;</m:t>
+                                  </m:r>
+                                  <m:r>
+                                    <m:rPr>
+                                      <m:nor/>
+                                    </m:rPr>
+                                    <a:rPr kumimoji="1" lang="en-US" altLang="zh-TW" dirty="0"/>
+                                    <m:t>x</m:t>
+                                  </m:r>
+                                  <m:r>
+                                    <m:rPr>
+                                      <m:nor/>
+                                    </m:rPr>
+                                    <a:rPr kumimoji="1" lang="en-US" altLang="zh-TW" baseline="-25000" dirty="0"/>
+                                    <m:t>t</m:t>
+                                  </m:r>
+                                  <m:r>
+                                    <m:rPr>
+                                      <m:nor/>
+                                    </m:rPr>
+                                    <a:rPr kumimoji="1" lang="en-US" altLang="zh-TW" baseline="-25000" dirty="0"/>
+                                    <m:t> = </m:t>
+                                  </m:r>
+                                  <m:r>
+                                    <m:rPr>
+                                      <m:nor/>
+                                    </m:rPr>
+                                    <a:rPr kumimoji="1" lang="en-US" altLang="zh-TW" dirty="0"/>
+                                    <m:t>(</m:t>
+                                  </m:r>
+                                  <m:r>
+                                    <m:rPr>
+                                      <m:nor/>
+                                    </m:rPr>
+                                    <a:rPr kumimoji="1" lang="en-US" altLang="zh-TW" dirty="0"/>
+                                    <m:t>y</m:t>
+                                  </m:r>
+                                  <m:r>
+                                    <m:rPr>
+                                      <m:nor/>
+                                    </m:rPr>
+                                    <a:rPr kumimoji="1" lang="en-US" altLang="zh-TW" dirty="0"/>
+                                    <m:t> </m:t>
+                                  </m:r>
+                                  <m:r>
+                                    <m:rPr>
+                                      <m:nor/>
+                                    </m:rPr>
+                                    <a:rPr kumimoji="1" lang="en-US" altLang="zh-TW" i="1" dirty="0"/>
+                                    <m:t>-</m:t>
+                                  </m:r>
+                                  <m:r>
+                                    <m:rPr>
+                                      <m:nor/>
+                                    </m:rPr>
+                                    <a:rPr kumimoji="1" lang="en-US" altLang="zh-TW" dirty="0"/>
+                                    <m:t> </m:t>
+                                  </m:r>
+                                  <m:d>
+                                    <m:dPr>
+                                      <m:begChr m:val="⌊"/>
+                                      <m:endChr m:val="⌋"/>
+                                      <m:ctrlPr>
+                                        <a:rPr kumimoji="1" lang="en-US" altLang="zh-TW" i="1" dirty="0">
+                                          <a:latin typeface="Cambria Math" panose="02040503050406030204" pitchFamily="18" charset="0"/>
+                                        </a:rPr>
+                                      </m:ctrlPr>
+                                    </m:dPr>
+                                    <m:e>
+                                      <m:f>
+                                        <m:fPr>
+                                          <m:ctrlPr>
+                                            <a:rPr kumimoji="1" lang="en-US" altLang="zh-TW" i="1" dirty="0">
+                                              <a:latin typeface="Cambria Math" panose="02040503050406030204" pitchFamily="18" charset="0"/>
+                                            </a:rPr>
+                                          </m:ctrlPr>
+                                        </m:fPr>
+                                        <m:num>
+                                          <m:r>
+                                            <m:rPr>
+                                              <m:sty m:val="p"/>
+                                            </m:rPr>
+                                            <a:rPr kumimoji="1" lang="en-US" altLang="zh-TW" dirty="0">
+                                              <a:latin typeface="Cambria Math" panose="02040503050406030204" pitchFamily="18" charset="0"/>
+                                            </a:rPr>
+                                            <m:t>b</m:t>
+                                          </m:r>
+                                        </m:num>
+                                        <m:den>
+                                          <m:r>
+                                            <m:rPr>
+                                              <m:sty m:val="p"/>
+                                            </m:rPr>
+                                            <a:rPr kumimoji="1" lang="en-US" altLang="zh-TW" dirty="0">
+                                              <a:latin typeface="Cambria Math" panose="02040503050406030204" pitchFamily="18" charset="0"/>
+                                            </a:rPr>
+                                            <m:t>a</m:t>
+                                          </m:r>
+                                        </m:den>
+                                      </m:f>
+                                    </m:e>
+                                  </m:d>
+                                  <m:r>
+                                    <m:rPr>
+                                      <m:nor/>
+                                    </m:rPr>
+                                    <a:rPr kumimoji="1" lang="en-US" altLang="zh-TW" dirty="0"/>
+                                    <m:t>⋅</m:t>
+                                  </m:r>
+                                  <m:r>
+                                    <m:rPr>
+                                      <m:nor/>
+                                    </m:rPr>
+                                    <a:rPr kumimoji="1" lang="en-US" altLang="zh-TW" dirty="0"/>
+                                    <m:t>x</m:t>
+                                  </m:r>
+                                  <m:r>
+                                    <m:rPr>
+                                      <m:nor/>
+                                    </m:rPr>
+                                    <a:rPr kumimoji="1" lang="en-US" altLang="zh-TW" dirty="0"/>
+                                    <m:t>) </m:t>
+                                  </m:r>
+                                </m:e>
+                                <m:e>
+                                  <m:r>
+                                    <a:rPr kumimoji="1" lang="en-US" altLang="zh-TW" i="1">
+                                      <a:latin typeface="Cambria Math" panose="02040503050406030204" pitchFamily="18" charset="0"/>
+                                    </a:rPr>
+                                    <m:t>&amp;</m:t>
+                                  </m:r>
+                                  <m:r>
+                                    <m:rPr>
+                                      <m:nor/>
+                                    </m:rPr>
+                                    <a:rPr kumimoji="1" lang="en-US" altLang="zh-TW" dirty="0"/>
+                                    <m:t>y</m:t>
+                                  </m:r>
+                                  <m:r>
+                                    <m:rPr>
+                                      <m:nor/>
+                                    </m:rPr>
+                                    <a:rPr kumimoji="1" lang="en-US" altLang="zh-TW" baseline="-25000" dirty="0"/>
+                                    <m:t>t</m:t>
+                                  </m:r>
+                                  <m:r>
+                                    <m:rPr>
+                                      <m:nor/>
+                                    </m:rPr>
+                                    <a:rPr kumimoji="1" lang="en-US" altLang="zh-TW" baseline="-25000" dirty="0"/>
+                                    <m:t> = </m:t>
+                                  </m:r>
+                                  <m:r>
+                                    <m:rPr>
+                                      <m:nor/>
+                                    </m:rPr>
+                                    <a:rPr kumimoji="1" lang="en-US" altLang="zh-TW" dirty="0"/>
+                                    <m:t>x</m:t>
+                                  </m:r>
+                                  <m:r>
+                                    <m:rPr>
+                                      <m:nor/>
+                                    </m:rPr>
+                                    <a:rPr kumimoji="1" lang="en-US" altLang="zh-TW" dirty="0"/>
+                                    <m:t> </m:t>
+                                  </m:r>
+                                </m:e>
+                              </m:eqArr>
+                            </m:e>
+                          </m:mr>
+                          <m:mr>
+                            <m:e/>
+                          </m:mr>
+                        </m:m>
+                      </m:e>
+                    </m:d>
+                  </m:oMath>
+                </a14:m>
+                <a:endParaRPr kumimoji="1" lang="en-US" altLang="zh-TW" dirty="0"/>
+              </a:p>
+            </p:txBody>
+          </p:sp>
+        </mc:Choice>
+        <mc:Fallback>
+          <p:sp>
+            <p:nvSpPr>
+              <p:cNvPr id="3" name="內容版面配置區 2">
+                <a:extLst>
+                  <a:ext uri="{FF2B5EF4-FFF2-40B4-BE49-F238E27FC236}">
+                    <a16:creationId xmlns:a16="http://schemas.microsoft.com/office/drawing/2014/main" id="{F3171F7E-4F6B-4DDA-87B8-0779F10F59F3}"/>
+                  </a:ext>
+                </a:extLst>
+              </p:cNvPr>
+              <p:cNvSpPr>
+                <a:spLocks noGrp="1" noRot="1" noChangeAspect="1" noMove="1" noResize="1" noEditPoints="1" noAdjustHandles="1" noChangeArrowheads="1" noChangeShapeType="1" noTextEdit="1"/>
+              </p:cNvSpPr>
+              <p:nvPr>
+                <p:ph idx="1"/>
+              </p:nvPr>
+            </p:nvSpPr>
+            <p:spPr>
+              <a:blipFill>
+                <a:blip r:embed="rId2"/>
+                <a:stretch>
+                  <a:fillRect l="-1797" t="-4622"/>
+                </a:stretch>
+              </a:blipFill>
+            </p:spPr>
+            <p:txBody>
+              <a:bodyPr/>
+              <a:lstStyle/>
+              <a:p>
+                <a:r>
+                  <a:rPr lang="ja-JP" altLang="en-US">
+                    <a:noFill/>
+                  </a:rPr>
+                  <a:t> </a:t>
+                </a:r>
+              </a:p>
+            </p:txBody>
+          </p:sp>
+        </mc:Fallback>
+      </mc:AlternateContent>
       <p:sp>
         <p:nvSpPr>
-          <p:cNvPr id="3" name="內容版面配置區 2">
+          <p:cNvPr id="4" name="箭號: 向右 3">
             <a:extLst>
               <a:ext uri="{FF2B5EF4-FFF2-40B4-BE49-F238E27FC236}">
-                <a16:creationId xmlns:a16="http://schemas.microsoft.com/office/drawing/2014/main" id="{F3171F7E-4F6B-4DDA-87B8-0779F10F59F3}"/>
+                <a16:creationId xmlns:a16="http://schemas.microsoft.com/office/drawing/2014/main" id="{CDEE074E-BC8C-4309-9565-C49CBADD0CCC}"/>
               </a:ext>
             </a:extLst>
           </p:cNvPr>
-          <p:cNvSpPr>
-            <a:spLocks noGrp="1"/>
-          </p:cNvSpPr>
-          <p:nvPr>
-            <p:ph idx="1"/>
-          </p:nvPr>
+          <p:cNvSpPr/>
+          <p:nvPr/>
         </p:nvSpPr>
-        <p:spPr/>
+        <p:spPr>
+          <a:xfrm>
+            <a:off x="923261" y="4740098"/>
+            <a:ext cx="1830572" cy="531627"/>
+          </a:xfrm>
+          <a:prstGeom prst="rightArrow">
+            <a:avLst/>
+          </a:prstGeom>
+        </p:spPr>
+        <p:style>
+          <a:lnRef idx="2">
+            <a:schemeClr val="accent1">
+              <a:shade val="50000"/>
+            </a:schemeClr>
+          </a:lnRef>
+          <a:fillRef idx="1">
+            <a:schemeClr val="accent1"/>
+          </a:fillRef>
+          <a:effectRef idx="0">
+            <a:schemeClr val="accent1"/>
+          </a:effectRef>
+          <a:fontRef idx="minor">
+            <a:schemeClr val="lt1"/>
+          </a:fontRef>
+        </p:style>
         <p:txBody>
-          <a:bodyPr>
-            <a:normAutofit/>
-          </a:bodyPr>
+          <a:bodyPr rtlCol="0" anchor="ctr"/>
           <a:lstStyle/>
           <a:p>
-            <a:pPr marL="0" indent="0">
-              <a:buNone/>
-            </a:pPr>
-            <a:r>
-              <a:rPr kumimoji="1" lang="zh-TW" altLang="en-US" dirty="0"/>
-              <a:t>考慮輾轉相除法，對</a:t>
-            </a:r>
-            <a:r>
-              <a:rPr kumimoji="1" lang="zh-TW" altLang="en-US" b="1" dirty="0"/>
-              <a:t>過程中</a:t>
-            </a:r>
-            <a:r>
-              <a:rPr kumimoji="1" lang="zh-TW" altLang="en-US" dirty="0"/>
-              <a:t>任意 </a:t>
-            </a:r>
-            <a:r>
-              <a:rPr kumimoji="1" lang="en-US" altLang="zh-TW" dirty="0"/>
-              <a:t>a, b </a:t>
-            </a:r>
-            <a:r>
-              <a:rPr kumimoji="1" lang="zh-TW" altLang="en-US" dirty="0"/>
-              <a:t>有</a:t>
-            </a:r>
-            <a:endParaRPr kumimoji="1" lang="en-US" altLang="zh-TW" dirty="0">
-              <a:solidFill>
-                <a:schemeClr val="bg1">
-                  <a:lumMod val="65000"/>
-                </a:schemeClr>
-              </a:solidFill>
-            </a:endParaRPr>
-          </a:p>
-          <a:p>
-            <a:pPr marL="0" indent="0">
-              <a:buNone/>
-            </a:pPr>
-            <a:endParaRPr kumimoji="1" lang="en-US" altLang="zh-TW" dirty="0"/>
-          </a:p>
-          <a:p>
-            <a:pPr marL="0" indent="0" algn="ctr">
-              <a:buNone/>
-            </a:pPr>
-            <a:r>
-              <a:rPr kumimoji="1" lang="en-US" altLang="zh-TW" dirty="0"/>
-              <a:t>g = b x + a (y − ⌊b/a⌋⋅x)</a:t>
-            </a:r>
-          </a:p>
-          <a:p>
-            <a:pPr marL="0" indent="0" algn="ctr">
-              <a:buNone/>
-            </a:pPr>
-            <a:endParaRPr kumimoji="1" lang="en-US" altLang="zh-TW" dirty="0"/>
-          </a:p>
-          <a:p>
-            <a:pPr marL="0" indent="0">
-              <a:buNone/>
-            </a:pPr>
-            <a:r>
-              <a:rPr kumimoji="1" lang="zh-TW" altLang="en-US" dirty="0"/>
-              <a:t>對於 </a:t>
-            </a:r>
-            <a:r>
-              <a:rPr kumimoji="1" lang="en-US" altLang="zh-TW" dirty="0"/>
-              <a:t>a </a:t>
-            </a:r>
-            <a:r>
-              <a:rPr kumimoji="1" lang="zh-TW" altLang="en-US" dirty="0"/>
-              <a:t>與 </a:t>
-            </a:r>
-            <a:r>
-              <a:rPr kumimoji="1" lang="en-US" altLang="zh-TW" dirty="0"/>
-              <a:t>b </a:t>
-            </a:r>
-            <a:r>
-              <a:rPr kumimoji="1" lang="zh-TW" altLang="en-US" dirty="0"/>
-              <a:t>的貝祖等式</a:t>
-            </a:r>
-            <a:endParaRPr kumimoji="1" lang="en-US" altLang="zh-TW" dirty="0"/>
+            <a:pPr algn="ctr"/>
+            <a:endParaRPr kumimoji="1" lang="ja-JP" altLang="en-US"/>
           </a:p>
         </p:txBody>
       </p:sp>
     </p:spTree>
     <p:extLst>
       <p:ext uri="{BB962C8B-B14F-4D97-AF65-F5344CB8AC3E}">
-        <p14:creationId xmlns:p14="http://schemas.microsoft.com/office/powerpoint/2010/main" val="3188060232"/>
+        <p14:creationId xmlns:p14="http://schemas.microsoft.com/office/powerpoint/2010/main" val="3924615829"/>
       </p:ext>
     </p:extLst>
   </p:cSld>
@@ -11574,161 +12252,293 @@
           </a:p>
         </p:txBody>
       </p:sp>
+      <mc:AlternateContent xmlns:mc="http://schemas.openxmlformats.org/markup-compatibility/2006">
+        <mc:Choice xmlns:a14="http://schemas.microsoft.com/office/drawing/2010/main" Requires="a14">
+          <p:sp>
+            <p:nvSpPr>
+              <p:cNvPr id="3" name="內容版面配置區 2">
+                <a:extLst>
+                  <a:ext uri="{FF2B5EF4-FFF2-40B4-BE49-F238E27FC236}">
+                    <a16:creationId xmlns:a16="http://schemas.microsoft.com/office/drawing/2014/main" id="{F3171F7E-4F6B-4DDA-87B8-0779F10F59F3}"/>
+                  </a:ext>
+                </a:extLst>
+              </p:cNvPr>
+              <p:cNvSpPr>
+                <a:spLocks noGrp="1"/>
+              </p:cNvSpPr>
+              <p:nvPr>
+                <p:ph idx="1"/>
+              </p:nvPr>
+            </p:nvSpPr>
+            <p:spPr/>
+            <p:txBody>
+              <a:bodyPr>
+                <a:normAutofit/>
+              </a:bodyPr>
+              <a:lstStyle/>
+              <a:p>
+                <a:pPr marL="0" indent="0">
+                  <a:buNone/>
+                </a:pPr>
+                <a:r>
+                  <a:rPr kumimoji="1" lang="zh-TW" altLang="en-US" dirty="0"/>
+                  <a:t>考慮輾轉相除法，對</a:t>
+                </a:r>
+                <a:r>
+                  <a:rPr kumimoji="1" lang="zh-TW" altLang="en-US" b="1" dirty="0"/>
+                  <a:t>過程中</a:t>
+                </a:r>
+                <a:r>
+                  <a:rPr kumimoji="1" lang="zh-TW" altLang="en-US" dirty="0"/>
+                  <a:t>任意 </a:t>
+                </a:r>
+                <a:r>
+                  <a:rPr kumimoji="1" lang="en-US" altLang="zh-TW" dirty="0"/>
+                  <a:t>a, b </a:t>
+                </a:r>
+                <a:r>
+                  <a:rPr kumimoji="1" lang="zh-TW" altLang="en-US" dirty="0"/>
+                  <a:t>有</a:t>
+                </a:r>
+                <a:endParaRPr kumimoji="1" lang="en-US" altLang="zh-TW" dirty="0">
+                  <a:solidFill>
+                    <a:schemeClr val="bg1">
+                      <a:lumMod val="65000"/>
+                    </a:schemeClr>
+                  </a:solidFill>
+                </a:endParaRPr>
+              </a:p>
+              <a:p>
+                <a:pPr marL="0" indent="0">
+                  <a:buNone/>
+                </a:pPr>
+                <a:endParaRPr kumimoji="1" lang="en-US" altLang="zh-TW" dirty="0"/>
+              </a:p>
+              <a:p>
+                <a:pPr marL="0" indent="0" algn="ctr">
+                  <a:buNone/>
+                </a:pPr>
+                <a:r>
+                  <a:rPr kumimoji="1" lang="en-US" altLang="zh-TW" dirty="0"/>
+                  <a:t>g = b x + a (y − </a:t>
+                </a:r>
+                <a14:m>
+                  <m:oMath xmlns:m="http://schemas.openxmlformats.org/officeDocument/2006/math">
+                    <m:d>
+                      <m:dPr>
+                        <m:begChr m:val="⌊"/>
+                        <m:endChr m:val="⌋"/>
+                        <m:ctrlPr>
+                          <a:rPr kumimoji="1" lang="en-US" altLang="zh-TW" dirty="0">
+                            <a:latin typeface="Cambria Math" panose="02040503050406030204" pitchFamily="18" charset="0"/>
+                          </a:rPr>
+                        </m:ctrlPr>
+                      </m:dPr>
+                      <m:e>
+                        <m:f>
+                          <m:fPr>
+                            <m:ctrlPr>
+                              <a:rPr kumimoji="1" lang="en-US" altLang="zh-TW" dirty="0">
+                                <a:latin typeface="Cambria Math" panose="02040503050406030204" pitchFamily="18" charset="0"/>
+                              </a:rPr>
+                            </m:ctrlPr>
+                          </m:fPr>
+                          <m:num>
+                            <m:r>
+                              <m:rPr>
+                                <m:sty m:val="p"/>
+                              </m:rPr>
+                              <a:rPr kumimoji="1" lang="en-US" altLang="zh-TW" i="0" dirty="0">
+                                <a:latin typeface="Cambria Math" panose="02040503050406030204" pitchFamily="18" charset="0"/>
+                              </a:rPr>
+                              <m:t>b</m:t>
+                            </m:r>
+                          </m:num>
+                          <m:den>
+                            <m:r>
+                              <m:rPr>
+                                <m:sty m:val="p"/>
+                              </m:rPr>
+                              <a:rPr kumimoji="1" lang="en-US" altLang="zh-TW" i="0" dirty="0">
+                                <a:latin typeface="Cambria Math" panose="02040503050406030204" pitchFamily="18" charset="0"/>
+                              </a:rPr>
+                              <m:t>a</m:t>
+                            </m:r>
+                          </m:den>
+                        </m:f>
+                      </m:e>
+                    </m:d>
+                    <m:r>
+                      <m:rPr>
+                        <m:nor/>
+                      </m:rPr>
+                      <a:rPr kumimoji="1" lang="en-US" altLang="zh-TW" dirty="0"/>
+                      <m:t>⋅</m:t>
+                    </m:r>
+                  </m:oMath>
+                </a14:m>
+                <a:r>
+                  <a:rPr kumimoji="1" lang="en-US" altLang="zh-TW" dirty="0"/>
+                  <a:t>x)</a:t>
+                </a:r>
+              </a:p>
+              <a:p>
+                <a:pPr marL="0" indent="0">
+                  <a:buNone/>
+                </a:pPr>
+                <a:endParaRPr kumimoji="1" lang="en-US" altLang="zh-TW" dirty="0"/>
+              </a:p>
+              <a:p>
+                <a:pPr marL="0" indent="0">
+                  <a:buNone/>
+                </a:pPr>
+                <a:r>
+                  <a:rPr kumimoji="1" lang="en-US" altLang="zh-TW" dirty="0"/>
+                  <a:t>a </a:t>
+                </a:r>
+                <a:r>
+                  <a:rPr kumimoji="1" lang="zh-TW" altLang="en-US" dirty="0"/>
+                  <a:t>與 </a:t>
+                </a:r>
+                <a:r>
+                  <a:rPr kumimoji="1" lang="en-US" altLang="zh-TW" dirty="0"/>
+                  <a:t>b </a:t>
+                </a:r>
+                <a:r>
+                  <a:rPr kumimoji="1" lang="zh-TW" altLang="en-US" dirty="0"/>
+                  <a:t>的貝祖等式</a:t>
+                </a:r>
+                <a:endParaRPr kumimoji="1" lang="en-US" altLang="zh-TW" dirty="0"/>
+              </a:p>
+              <a:p>
+                <a:pPr marL="0" indent="0" algn="ctr">
+                  <a:buNone/>
+                </a:pPr>
+                <a:r>
+                  <a:rPr kumimoji="1" lang="en-US" altLang="zh-TW" dirty="0"/>
+                  <a:t>g = a </a:t>
+                </a:r>
+                <a:r>
+                  <a:rPr kumimoji="1" lang="en-US" altLang="zh-TW" dirty="0" err="1"/>
+                  <a:t>x</a:t>
+                </a:r>
+                <a:r>
+                  <a:rPr kumimoji="1" lang="en-US" altLang="zh-TW" baseline="-25000" dirty="0" err="1"/>
+                  <a:t>t</a:t>
+                </a:r>
+                <a:r>
+                  <a:rPr kumimoji="1" lang="en-US" altLang="zh-TW" dirty="0"/>
+                  <a:t> + b </a:t>
+                </a:r>
+                <a:r>
+                  <a:rPr kumimoji="1" lang="en-US" altLang="zh-TW" dirty="0" err="1"/>
+                  <a:t>y</a:t>
+                </a:r>
+                <a:r>
+                  <a:rPr kumimoji="1" lang="en-US" altLang="zh-TW" baseline="-25000" dirty="0" err="1"/>
+                  <a:t>t</a:t>
+                </a:r>
+                <a:endParaRPr kumimoji="1" lang="en-US" altLang="zh-TW" dirty="0"/>
+              </a:p>
+              <a:p>
+                <a:pPr marL="0" indent="0" algn="ctr">
+                  <a:buNone/>
+                </a:pPr>
+                <a:endParaRPr kumimoji="1" lang="en-US" altLang="zh-TW" dirty="0"/>
+              </a:p>
+            </p:txBody>
+          </p:sp>
+        </mc:Choice>
+        <mc:Fallback>
+          <p:sp>
+            <p:nvSpPr>
+              <p:cNvPr id="3" name="內容版面配置區 2">
+                <a:extLst>
+                  <a:ext uri="{FF2B5EF4-FFF2-40B4-BE49-F238E27FC236}">
+                    <a16:creationId xmlns:a16="http://schemas.microsoft.com/office/drawing/2014/main" id="{F3171F7E-4F6B-4DDA-87B8-0779F10F59F3}"/>
+                  </a:ext>
+                </a:extLst>
+              </p:cNvPr>
+              <p:cNvSpPr>
+                <a:spLocks noGrp="1" noRot="1" noChangeAspect="1" noMove="1" noResize="1" noEditPoints="1" noAdjustHandles="1" noChangeArrowheads="1" noChangeShapeType="1" noTextEdit="1"/>
+              </p:cNvSpPr>
+              <p:nvPr>
+                <p:ph idx="1"/>
+              </p:nvPr>
+            </p:nvSpPr>
+            <p:spPr>
+              <a:blipFill>
+                <a:blip r:embed="rId2"/>
+                <a:stretch>
+                  <a:fillRect l="-1797" t="-3361"/>
+                </a:stretch>
+              </a:blipFill>
+            </p:spPr>
+            <p:txBody>
+              <a:bodyPr/>
+              <a:lstStyle/>
+              <a:p>
+                <a:r>
+                  <a:rPr lang="ja-JP" altLang="en-US">
+                    <a:noFill/>
+                  </a:rPr>
+                  <a:t> </a:t>
+                </a:r>
+              </a:p>
+            </p:txBody>
+          </p:sp>
+        </mc:Fallback>
+      </mc:AlternateContent>
       <p:sp>
         <p:nvSpPr>
-          <p:cNvPr id="3" name="內容版面配置區 2">
+          <p:cNvPr id="7" name="箭號: 向右 6">
             <a:extLst>
               <a:ext uri="{FF2B5EF4-FFF2-40B4-BE49-F238E27FC236}">
-                <a16:creationId xmlns:a16="http://schemas.microsoft.com/office/drawing/2014/main" id="{F3171F7E-4F6B-4DDA-87B8-0779F10F59F3}"/>
+                <a16:creationId xmlns:a16="http://schemas.microsoft.com/office/drawing/2014/main" id="{24BB1DA2-43F2-4378-94D2-11609700ED75}"/>
               </a:ext>
             </a:extLst>
           </p:cNvPr>
-          <p:cNvSpPr>
-            <a:spLocks noGrp="1"/>
-          </p:cNvSpPr>
-          <p:nvPr>
-            <p:ph idx="1"/>
-          </p:nvPr>
+          <p:cNvSpPr/>
+          <p:nvPr/>
         </p:nvSpPr>
-        <p:spPr/>
+        <p:spPr>
+          <a:xfrm>
+            <a:off x="923261" y="5282364"/>
+            <a:ext cx="1830572" cy="531627"/>
+          </a:xfrm>
+          <a:prstGeom prst="rightArrow">
+            <a:avLst/>
+          </a:prstGeom>
+        </p:spPr>
+        <p:style>
+          <a:lnRef idx="2">
+            <a:schemeClr val="accent1">
+              <a:shade val="50000"/>
+            </a:schemeClr>
+          </a:lnRef>
+          <a:fillRef idx="1">
+            <a:schemeClr val="accent1"/>
+          </a:fillRef>
+          <a:effectRef idx="0">
+            <a:schemeClr val="accent1"/>
+          </a:effectRef>
+          <a:fontRef idx="minor">
+            <a:schemeClr val="lt1"/>
+          </a:fontRef>
+        </p:style>
         <p:txBody>
-          <a:bodyPr>
-            <a:normAutofit/>
-          </a:bodyPr>
+          <a:bodyPr rtlCol="0" anchor="ctr"/>
           <a:lstStyle/>
           <a:p>
-            <a:pPr marL="0" indent="0">
-              <a:buNone/>
-            </a:pPr>
-            <a:r>
-              <a:rPr kumimoji="1" lang="zh-TW" altLang="en-US" dirty="0"/>
-              <a:t>考慮輾轉相除法，對</a:t>
-            </a:r>
-            <a:r>
-              <a:rPr kumimoji="1" lang="zh-TW" altLang="en-US" b="1" dirty="0"/>
-              <a:t>過程中</a:t>
-            </a:r>
-            <a:r>
-              <a:rPr kumimoji="1" lang="zh-TW" altLang="en-US" dirty="0"/>
-              <a:t>任意 </a:t>
-            </a:r>
-            <a:r>
-              <a:rPr kumimoji="1" lang="en-US" altLang="zh-TW" dirty="0"/>
-              <a:t>a, b </a:t>
-            </a:r>
-            <a:r>
-              <a:rPr kumimoji="1" lang="zh-TW" altLang="en-US" dirty="0"/>
-              <a:t>有</a:t>
-            </a:r>
-            <a:endParaRPr kumimoji="1" lang="en-US" altLang="zh-TW" dirty="0">
-              <a:solidFill>
-                <a:schemeClr val="bg1">
-                  <a:lumMod val="65000"/>
-                </a:schemeClr>
-              </a:solidFill>
-            </a:endParaRPr>
-          </a:p>
-          <a:p>
-            <a:pPr marL="0" indent="0">
-              <a:buNone/>
-            </a:pPr>
-            <a:endParaRPr kumimoji="1" lang="en-US" altLang="zh-TW" dirty="0"/>
-          </a:p>
-          <a:p>
-            <a:pPr marL="0" indent="0" algn="ctr">
-              <a:buNone/>
-            </a:pPr>
-            <a:r>
-              <a:rPr kumimoji="1" lang="en-US" altLang="zh-TW" dirty="0"/>
-              <a:t>g = b x + a (y − ⌊b/a⌋⋅x)</a:t>
-            </a:r>
-          </a:p>
-          <a:p>
-            <a:pPr marL="0" indent="0" algn="ctr">
-              <a:buNone/>
-            </a:pPr>
-            <a:endParaRPr kumimoji="1" lang="en-US" altLang="zh-TW" dirty="0"/>
-          </a:p>
-          <a:p>
-            <a:pPr marL="0" indent="0">
-              <a:buNone/>
-            </a:pPr>
-            <a:r>
-              <a:rPr kumimoji="1" lang="zh-TW" altLang="en-US" dirty="0"/>
-              <a:t>對於 </a:t>
-            </a:r>
-            <a:r>
-              <a:rPr kumimoji="1" lang="en-US" altLang="zh-TW" dirty="0"/>
-              <a:t>a </a:t>
-            </a:r>
-            <a:r>
-              <a:rPr kumimoji="1" lang="zh-TW" altLang="en-US" dirty="0"/>
-              <a:t>與 </a:t>
-            </a:r>
-            <a:r>
-              <a:rPr kumimoji="1" lang="en-US" altLang="zh-TW" dirty="0"/>
-              <a:t>b </a:t>
-            </a:r>
-            <a:r>
-              <a:rPr kumimoji="1" lang="zh-TW" altLang="en-US" dirty="0"/>
-              <a:t>的貝祖等式</a:t>
-            </a:r>
-            <a:endParaRPr kumimoji="1" lang="en-US" altLang="zh-TW" dirty="0"/>
-          </a:p>
-          <a:p>
-            <a:pPr marL="0" indent="0">
-              <a:buNone/>
-            </a:pPr>
-            <a:r>
-              <a:rPr kumimoji="1" lang="en-US" altLang="zh-TW" dirty="0" err="1"/>
-              <a:t>x</a:t>
-            </a:r>
-            <a:r>
-              <a:rPr kumimoji="1" lang="en-US" altLang="zh-TW" baseline="-25000" dirty="0" err="1"/>
-              <a:t>t</a:t>
-            </a:r>
-            <a:r>
-              <a:rPr kumimoji="1" lang="en-US" altLang="zh-TW" baseline="-25000" dirty="0"/>
-              <a:t> </a:t>
-            </a:r>
-            <a:r>
-              <a:rPr kumimoji="1" lang="en-US" altLang="zh-TW" dirty="0"/>
-              <a:t>= (y − ⌊b/a⌋⋅x)</a:t>
-            </a:r>
-          </a:p>
-          <a:p>
-            <a:pPr marL="0" indent="0">
-              <a:buNone/>
-            </a:pPr>
-            <a:r>
-              <a:rPr kumimoji="1" lang="en-US" altLang="zh-TW" dirty="0" err="1"/>
-              <a:t>y</a:t>
-            </a:r>
-            <a:r>
-              <a:rPr kumimoji="1" lang="en-US" altLang="zh-TW" baseline="-25000" dirty="0" err="1"/>
-              <a:t>t</a:t>
-            </a:r>
-            <a:r>
-              <a:rPr kumimoji="1" lang="en-US" altLang="zh-TW" baseline="-25000" dirty="0"/>
-              <a:t> </a:t>
-            </a:r>
-            <a:r>
-              <a:rPr kumimoji="1" lang="en-US" altLang="zh-TW" dirty="0"/>
-              <a:t>= x</a:t>
-            </a:r>
-          </a:p>
-          <a:p>
-            <a:pPr marL="0" indent="0" algn="ctr">
-              <a:buNone/>
-            </a:pPr>
-            <a:endParaRPr kumimoji="1" lang="en-US" altLang="zh-TW" dirty="0"/>
+            <a:pPr algn="ctr"/>
+            <a:endParaRPr kumimoji="1" lang="ja-JP" altLang="en-US"/>
           </a:p>
         </p:txBody>
       </p:sp>
     </p:spTree>
     <p:extLst>
       <p:ext uri="{BB962C8B-B14F-4D97-AF65-F5344CB8AC3E}">
-        <p14:creationId xmlns:p14="http://schemas.microsoft.com/office/powerpoint/2010/main" val="3924615829"/>
+        <p14:creationId xmlns:p14="http://schemas.microsoft.com/office/powerpoint/2010/main" val="2312293447"/>
       </p:ext>
     </p:extLst>
   </p:cSld>
@@ -11784,188 +12594,436 @@
           </a:p>
         </p:txBody>
       </p:sp>
+      <mc:AlternateContent xmlns:mc="http://schemas.openxmlformats.org/markup-compatibility/2006">
+        <mc:Choice xmlns:a14="http://schemas.microsoft.com/office/drawing/2010/main" Requires="a14">
+          <p:sp>
+            <p:nvSpPr>
+              <p:cNvPr id="3" name="內容版面配置區 2">
+                <a:extLst>
+                  <a:ext uri="{FF2B5EF4-FFF2-40B4-BE49-F238E27FC236}">
+                    <a16:creationId xmlns:a16="http://schemas.microsoft.com/office/drawing/2014/main" id="{F3171F7E-4F6B-4DDA-87B8-0779F10F59F3}"/>
+                  </a:ext>
+                </a:extLst>
+              </p:cNvPr>
+              <p:cNvSpPr>
+                <a:spLocks noGrp="1"/>
+              </p:cNvSpPr>
+              <p:nvPr>
+                <p:ph idx="1"/>
+              </p:nvPr>
+            </p:nvSpPr>
+            <p:spPr/>
+            <p:txBody>
+              <a:bodyPr>
+                <a:normAutofit/>
+              </a:bodyPr>
+              <a:lstStyle/>
+              <a:p>
+                <a:pPr marL="0" indent="0">
+                  <a:buNone/>
+                </a:pPr>
+                <a:r>
+                  <a:rPr kumimoji="1" lang="zh-TW" altLang="en-US" dirty="0"/>
+                  <a:t>考慮輾轉相除法，對</a:t>
+                </a:r>
+                <a:r>
+                  <a:rPr kumimoji="1" lang="zh-TW" altLang="en-US" b="1" dirty="0"/>
+                  <a:t>過程中</a:t>
+                </a:r>
+                <a:r>
+                  <a:rPr kumimoji="1" lang="zh-TW" altLang="en-US" dirty="0"/>
+                  <a:t>任意 </a:t>
+                </a:r>
+                <a:r>
+                  <a:rPr kumimoji="1" lang="en-US" altLang="zh-TW" dirty="0"/>
+                  <a:t>a, b </a:t>
+                </a:r>
+                <a:r>
+                  <a:rPr kumimoji="1" lang="zh-TW" altLang="en-US" dirty="0"/>
+                  <a:t>有</a:t>
+                </a:r>
+                <a:endParaRPr kumimoji="1" lang="en-US" altLang="zh-TW" dirty="0">
+                  <a:solidFill>
+                    <a:schemeClr val="bg1">
+                      <a:lumMod val="65000"/>
+                    </a:schemeClr>
+                  </a:solidFill>
+                </a:endParaRPr>
+              </a:p>
+              <a:p>
+                <a:pPr marL="0" indent="0">
+                  <a:buNone/>
+                </a:pPr>
+                <a:endParaRPr kumimoji="1" lang="en-US" altLang="zh-TW" dirty="0"/>
+              </a:p>
+              <a:p>
+                <a:pPr marL="0" indent="0" algn="ctr">
+                  <a:buNone/>
+                </a:pPr>
+                <a:r>
+                  <a:rPr kumimoji="1" lang="en-US" altLang="zh-TW" dirty="0"/>
+                  <a:t>g = a </a:t>
+                </a:r>
+                <a:r>
+                  <a:rPr kumimoji="1" lang="en-US" altLang="zh-TW" dirty="0" err="1"/>
+                  <a:t>x</a:t>
+                </a:r>
+                <a:r>
+                  <a:rPr kumimoji="1" lang="en-US" altLang="zh-TW" baseline="-25000" dirty="0" err="1"/>
+                  <a:t>t</a:t>
+                </a:r>
+                <a:r>
+                  <a:rPr kumimoji="1" lang="en-US" altLang="zh-TW" dirty="0"/>
+                  <a:t> + b </a:t>
+                </a:r>
+                <a:r>
+                  <a:rPr kumimoji="1" lang="en-US" altLang="zh-TW" dirty="0" err="1"/>
+                  <a:t>y</a:t>
+                </a:r>
+                <a:r>
+                  <a:rPr kumimoji="1" lang="en-US" altLang="zh-TW" baseline="-25000" dirty="0" err="1"/>
+                  <a:t>t</a:t>
+                </a:r>
+                <a:r>
+                  <a:rPr kumimoji="1" lang="zh-TW" altLang="en-US" baseline="-25000" dirty="0"/>
+                  <a:t> </a:t>
+                </a:r>
+                <a14:m>
+                  <m:oMath xmlns:m="http://schemas.openxmlformats.org/officeDocument/2006/math">
+                    <m:r>
+                      <a:rPr kumimoji="1" lang="zh-TW" altLang="en-US" i="1" baseline="-25000" dirty="0">
+                        <a:latin typeface="Cambria Math" panose="02040503050406030204" pitchFamily="18" charset="0"/>
+                      </a:rPr>
+                      <m:t> </m:t>
+                    </m:r>
+                    <m:r>
+                      <a:rPr kumimoji="1" lang="zh-TW" altLang="en-US" dirty="0">
+                        <a:latin typeface="Cambria Math" panose="02040503050406030204" pitchFamily="18" charset="0"/>
+                      </a:rPr>
+                      <m:t>其中</m:t>
+                    </m:r>
+                    <m:r>
+                      <a:rPr kumimoji="1" lang="zh-TW" altLang="en-US" i="1" smtClean="0">
+                        <a:latin typeface="Cambria Math" panose="02040503050406030204" pitchFamily="18" charset="0"/>
+                      </a:rPr>
+                      <m:t> </m:t>
+                    </m:r>
+                    <m:d>
+                      <m:dPr>
+                        <m:begChr m:val="{"/>
+                        <m:endChr m:val=""/>
+                        <m:ctrlPr>
+                          <a:rPr kumimoji="1" lang="en-US" altLang="zh-TW" smtClean="0">
+                            <a:latin typeface="Cambria Math" panose="02040503050406030204" pitchFamily="18" charset="0"/>
+                          </a:rPr>
+                        </m:ctrlPr>
+                      </m:dPr>
+                      <m:e>
+                        <m:m>
+                          <m:mPr>
+                            <m:plcHide m:val="on"/>
+                            <m:mcs>
+                              <m:mc>
+                                <m:mcPr>
+                                  <m:count m:val="1"/>
+                                  <m:mcJc m:val="center"/>
+                                </m:mcPr>
+                              </m:mc>
+                            </m:mcs>
+                            <m:ctrlPr>
+                              <a:rPr kumimoji="1" lang="en-US" altLang="zh-TW" i="1" smtClean="0">
+                                <a:latin typeface="Cambria Math" panose="02040503050406030204" pitchFamily="18" charset="0"/>
+                              </a:rPr>
+                            </m:ctrlPr>
+                          </m:mPr>
+                          <m:mr>
+                            <m:e>
+                              <m:eqArr>
+                                <m:eqArrPr>
+                                  <m:ctrlPr>
+                                    <a:rPr kumimoji="1" lang="en-US" altLang="zh-TW" i="1" smtClean="0">
+                                      <a:latin typeface="Cambria Math" panose="02040503050406030204" pitchFamily="18" charset="0"/>
+                                    </a:rPr>
+                                  </m:ctrlPr>
+                                </m:eqArrPr>
+                                <m:e>
+                                  <m:r>
+                                    <a:rPr kumimoji="1" lang="en-US" altLang="zh-TW" i="1">
+                                      <a:latin typeface="Cambria Math" panose="02040503050406030204" pitchFamily="18" charset="0"/>
+                                    </a:rPr>
+                                    <m:t>&amp;</m:t>
+                                  </m:r>
+                                  <m:r>
+                                    <m:rPr>
+                                      <m:nor/>
+                                    </m:rPr>
+                                    <a:rPr kumimoji="1" lang="en-US" altLang="zh-TW" dirty="0"/>
+                                    <m:t>x</m:t>
+                                  </m:r>
+                                  <m:r>
+                                    <m:rPr>
+                                      <m:nor/>
+                                    </m:rPr>
+                                    <a:rPr kumimoji="1" lang="en-US" altLang="zh-TW" baseline="-25000" dirty="0"/>
+                                    <m:t>t</m:t>
+                                  </m:r>
+                                  <m:r>
+                                    <m:rPr>
+                                      <m:nor/>
+                                    </m:rPr>
+                                    <a:rPr kumimoji="1" lang="en-US" altLang="zh-TW" baseline="-25000" dirty="0"/>
+                                    <m:t> = </m:t>
+                                  </m:r>
+                                  <m:r>
+                                    <m:rPr>
+                                      <m:nor/>
+                                    </m:rPr>
+                                    <a:rPr kumimoji="1" lang="en-US" altLang="zh-TW" dirty="0"/>
+                                    <m:t>(</m:t>
+                                  </m:r>
+                                  <m:r>
+                                    <m:rPr>
+                                      <m:nor/>
+                                    </m:rPr>
+                                    <a:rPr kumimoji="1" lang="en-US" altLang="zh-TW" dirty="0"/>
+                                    <m:t>y</m:t>
+                                  </m:r>
+                                  <m:r>
+                                    <m:rPr>
+                                      <m:nor/>
+                                    </m:rPr>
+                                    <a:rPr kumimoji="1" lang="en-US" altLang="zh-TW" dirty="0"/>
+                                    <m:t> </m:t>
+                                  </m:r>
+                                  <m:r>
+                                    <m:rPr>
+                                      <m:nor/>
+                                    </m:rPr>
+                                    <a:rPr kumimoji="1" lang="en-US" altLang="zh-TW" i="1" dirty="0"/>
+                                    <m:t>-</m:t>
+                                  </m:r>
+                                  <m:r>
+                                    <m:rPr>
+                                      <m:nor/>
+                                    </m:rPr>
+                                    <a:rPr kumimoji="1" lang="en-US" altLang="zh-TW" dirty="0"/>
+                                    <m:t> </m:t>
+                                  </m:r>
+                                  <m:d>
+                                    <m:dPr>
+                                      <m:begChr m:val="⌊"/>
+                                      <m:endChr m:val="⌋"/>
+                                      <m:ctrlPr>
+                                        <a:rPr kumimoji="1" lang="en-US" altLang="zh-TW" i="1" dirty="0">
+                                          <a:latin typeface="Cambria Math" panose="02040503050406030204" pitchFamily="18" charset="0"/>
+                                        </a:rPr>
+                                      </m:ctrlPr>
+                                    </m:dPr>
+                                    <m:e>
+                                      <m:f>
+                                        <m:fPr>
+                                          <m:ctrlPr>
+                                            <a:rPr kumimoji="1" lang="en-US" altLang="zh-TW" i="1" dirty="0">
+                                              <a:latin typeface="Cambria Math" panose="02040503050406030204" pitchFamily="18" charset="0"/>
+                                            </a:rPr>
+                                          </m:ctrlPr>
+                                        </m:fPr>
+                                        <m:num>
+                                          <m:r>
+                                            <m:rPr>
+                                              <m:sty m:val="p"/>
+                                            </m:rPr>
+                                            <a:rPr kumimoji="1" lang="en-US" altLang="zh-TW" dirty="0">
+                                              <a:latin typeface="Cambria Math" panose="02040503050406030204" pitchFamily="18" charset="0"/>
+                                            </a:rPr>
+                                            <m:t>b</m:t>
+                                          </m:r>
+                                        </m:num>
+                                        <m:den>
+                                          <m:r>
+                                            <m:rPr>
+                                              <m:sty m:val="p"/>
+                                            </m:rPr>
+                                            <a:rPr kumimoji="1" lang="en-US" altLang="zh-TW" dirty="0">
+                                              <a:latin typeface="Cambria Math" panose="02040503050406030204" pitchFamily="18" charset="0"/>
+                                            </a:rPr>
+                                            <m:t>a</m:t>
+                                          </m:r>
+                                        </m:den>
+                                      </m:f>
+                                    </m:e>
+                                  </m:d>
+                                  <m:r>
+                                    <m:rPr>
+                                      <m:nor/>
+                                    </m:rPr>
+                                    <a:rPr kumimoji="1" lang="en-US" altLang="zh-TW" dirty="0"/>
+                                    <m:t>⋅</m:t>
+                                  </m:r>
+                                  <m:r>
+                                    <m:rPr>
+                                      <m:nor/>
+                                    </m:rPr>
+                                    <a:rPr kumimoji="1" lang="en-US" altLang="zh-TW" dirty="0"/>
+                                    <m:t>x</m:t>
+                                  </m:r>
+                                  <m:r>
+                                    <m:rPr>
+                                      <m:nor/>
+                                    </m:rPr>
+                                    <a:rPr kumimoji="1" lang="en-US" altLang="zh-TW" dirty="0"/>
+                                    <m:t>) </m:t>
+                                  </m:r>
+                                </m:e>
+                                <m:e>
+                                  <m:r>
+                                    <a:rPr kumimoji="1" lang="en-US" altLang="zh-TW" i="1">
+                                      <a:latin typeface="Cambria Math" panose="02040503050406030204" pitchFamily="18" charset="0"/>
+                                    </a:rPr>
+                                    <m:t>&amp;</m:t>
+                                  </m:r>
+                                  <m:r>
+                                    <m:rPr>
+                                      <m:nor/>
+                                    </m:rPr>
+                                    <a:rPr kumimoji="1" lang="en-US" altLang="zh-TW" dirty="0"/>
+                                    <m:t>y</m:t>
+                                  </m:r>
+                                  <m:r>
+                                    <m:rPr>
+                                      <m:nor/>
+                                    </m:rPr>
+                                    <a:rPr kumimoji="1" lang="en-US" altLang="zh-TW" baseline="-25000" dirty="0"/>
+                                    <m:t>t</m:t>
+                                  </m:r>
+                                  <m:r>
+                                    <m:rPr>
+                                      <m:nor/>
+                                    </m:rPr>
+                                    <a:rPr kumimoji="1" lang="en-US" altLang="zh-TW" baseline="-25000" dirty="0"/>
+                                    <m:t> = </m:t>
+                                  </m:r>
+                                  <m:r>
+                                    <m:rPr>
+                                      <m:nor/>
+                                    </m:rPr>
+                                    <a:rPr kumimoji="1" lang="en-US" altLang="zh-TW" dirty="0"/>
+                                    <m:t>x</m:t>
+                                  </m:r>
+                                  <m:r>
+                                    <m:rPr>
+                                      <m:nor/>
+                                    </m:rPr>
+                                    <a:rPr kumimoji="1" lang="en-US" altLang="zh-TW" dirty="0"/>
+                                    <m:t> </m:t>
+                                  </m:r>
+                                </m:e>
+                              </m:eqArr>
+                            </m:e>
+                          </m:mr>
+                          <m:mr>
+                            <m:e/>
+                          </m:mr>
+                        </m:m>
+                      </m:e>
+                    </m:d>
+                  </m:oMath>
+                </a14:m>
+                <a:endParaRPr kumimoji="1" lang="en-US" altLang="zh-TW" dirty="0"/>
+              </a:p>
+            </p:txBody>
+          </p:sp>
+        </mc:Choice>
+        <mc:Fallback>
+          <p:sp>
+            <p:nvSpPr>
+              <p:cNvPr id="3" name="內容版面配置區 2">
+                <a:extLst>
+                  <a:ext uri="{FF2B5EF4-FFF2-40B4-BE49-F238E27FC236}">
+                    <a16:creationId xmlns:a16="http://schemas.microsoft.com/office/drawing/2014/main" id="{F3171F7E-4F6B-4DDA-87B8-0779F10F59F3}"/>
+                  </a:ext>
+                </a:extLst>
+              </p:cNvPr>
+              <p:cNvSpPr>
+                <a:spLocks noGrp="1" noRot="1" noChangeAspect="1" noMove="1" noResize="1" noEditPoints="1" noAdjustHandles="1" noChangeArrowheads="1" noChangeShapeType="1" noTextEdit="1"/>
+              </p:cNvSpPr>
+              <p:nvPr>
+                <p:ph idx="1"/>
+              </p:nvPr>
+            </p:nvSpPr>
+            <p:spPr>
+              <a:blipFill>
+                <a:blip r:embed="rId2"/>
+                <a:stretch>
+                  <a:fillRect l="-1797" t="-3361"/>
+                </a:stretch>
+              </a:blipFill>
+            </p:spPr>
+            <p:txBody>
+              <a:bodyPr/>
+              <a:lstStyle/>
+              <a:p>
+                <a:r>
+                  <a:rPr lang="ja-JP" altLang="en-US">
+                    <a:noFill/>
+                  </a:rPr>
+                  <a:t> </a:t>
+                </a:r>
+              </a:p>
+            </p:txBody>
+          </p:sp>
+        </mc:Fallback>
+      </mc:AlternateContent>
       <p:sp>
         <p:nvSpPr>
-          <p:cNvPr id="3" name="內容版面配置區 2">
+          <p:cNvPr id="4" name="箭號: 向右 3">
             <a:extLst>
               <a:ext uri="{FF2B5EF4-FFF2-40B4-BE49-F238E27FC236}">
-                <a16:creationId xmlns:a16="http://schemas.microsoft.com/office/drawing/2014/main" id="{F3171F7E-4F6B-4DDA-87B8-0779F10F59F3}"/>
+                <a16:creationId xmlns:a16="http://schemas.microsoft.com/office/drawing/2014/main" id="{1956C4A3-7FD5-4E36-8D06-3A5A0106683D}"/>
               </a:ext>
             </a:extLst>
           </p:cNvPr>
-          <p:cNvSpPr>
-            <a:spLocks noGrp="1"/>
-          </p:cNvSpPr>
-          <p:nvPr>
-            <p:ph idx="1"/>
-          </p:nvPr>
+          <p:cNvSpPr/>
+          <p:nvPr/>
         </p:nvSpPr>
-        <p:spPr/>
+        <p:spPr>
+          <a:xfrm>
+            <a:off x="923261" y="3666214"/>
+            <a:ext cx="1426534" cy="531627"/>
+          </a:xfrm>
+          <a:prstGeom prst="rightArrow">
+            <a:avLst/>
+          </a:prstGeom>
+        </p:spPr>
+        <p:style>
+          <a:lnRef idx="2">
+            <a:schemeClr val="accent1">
+              <a:shade val="50000"/>
+            </a:schemeClr>
+          </a:lnRef>
+          <a:fillRef idx="1">
+            <a:schemeClr val="accent1"/>
+          </a:fillRef>
+          <a:effectRef idx="0">
+            <a:schemeClr val="accent1"/>
+          </a:effectRef>
+          <a:fontRef idx="minor">
+            <a:schemeClr val="lt1"/>
+          </a:fontRef>
+        </p:style>
         <p:txBody>
-          <a:bodyPr>
-            <a:normAutofit/>
-          </a:bodyPr>
+          <a:bodyPr rtlCol="0" anchor="ctr"/>
           <a:lstStyle/>
           <a:p>
-            <a:pPr marL="0" indent="0">
-              <a:buNone/>
-            </a:pPr>
-            <a:r>
-              <a:rPr kumimoji="1" lang="zh-TW" altLang="en-US" dirty="0"/>
-              <a:t>考慮輾轉相除法，對</a:t>
-            </a:r>
-            <a:r>
-              <a:rPr kumimoji="1" lang="zh-TW" altLang="en-US" b="1" dirty="0"/>
-              <a:t>過程中</a:t>
-            </a:r>
-            <a:r>
-              <a:rPr kumimoji="1" lang="zh-TW" altLang="en-US" dirty="0"/>
-              <a:t>任意 </a:t>
-            </a:r>
-            <a:r>
-              <a:rPr kumimoji="1" lang="en-US" altLang="zh-TW" dirty="0"/>
-              <a:t>a, b </a:t>
-            </a:r>
-            <a:r>
-              <a:rPr kumimoji="1" lang="zh-TW" altLang="en-US" dirty="0"/>
-              <a:t>有</a:t>
-            </a:r>
-            <a:endParaRPr kumimoji="1" lang="en-US" altLang="zh-TW" dirty="0">
-              <a:solidFill>
-                <a:schemeClr val="bg1">
-                  <a:lumMod val="65000"/>
-                </a:schemeClr>
-              </a:solidFill>
-            </a:endParaRPr>
-          </a:p>
-          <a:p>
-            <a:pPr marL="0" indent="0">
-              <a:buNone/>
-            </a:pPr>
-            <a:endParaRPr kumimoji="1" lang="en-US" altLang="zh-TW" dirty="0"/>
-          </a:p>
-          <a:p>
-            <a:pPr marL="0" indent="0" algn="ctr">
-              <a:buNone/>
-            </a:pPr>
-            <a:r>
-              <a:rPr kumimoji="1" lang="en-US" altLang="zh-TW" dirty="0"/>
-              <a:t>g = b x + a (y − ⌊b/a⌋⋅x)</a:t>
-            </a:r>
-          </a:p>
-          <a:p>
-            <a:pPr marL="0" indent="0" algn="ctr">
-              <a:buNone/>
-            </a:pPr>
-            <a:endParaRPr kumimoji="1" lang="en-US" altLang="zh-TW" dirty="0"/>
-          </a:p>
-          <a:p>
-            <a:pPr marL="0" indent="0">
-              <a:buNone/>
-            </a:pPr>
-            <a:r>
-              <a:rPr kumimoji="1" lang="zh-TW" altLang="en-US" dirty="0"/>
-              <a:t>對於 </a:t>
-            </a:r>
-            <a:r>
-              <a:rPr kumimoji="1" lang="en-US" altLang="zh-TW" dirty="0"/>
-              <a:t>a </a:t>
-            </a:r>
-            <a:r>
-              <a:rPr kumimoji="1" lang="zh-TW" altLang="en-US" dirty="0"/>
-              <a:t>與 </a:t>
-            </a:r>
-            <a:r>
-              <a:rPr kumimoji="1" lang="en-US" altLang="zh-TW" dirty="0"/>
-              <a:t>b </a:t>
-            </a:r>
-            <a:r>
-              <a:rPr kumimoji="1" lang="zh-TW" altLang="en-US" dirty="0"/>
-              <a:t>的貝祖等式 </a:t>
-            </a:r>
-            <a:r>
-              <a:rPr kumimoji="1" lang="en-US" altLang="zh-TW" dirty="0"/>
-              <a:t>a </a:t>
-            </a:r>
-            <a:r>
-              <a:rPr kumimoji="1" lang="en-US" altLang="zh-TW" dirty="0" err="1"/>
-              <a:t>x</a:t>
-            </a:r>
-            <a:r>
-              <a:rPr kumimoji="1" lang="en-US" altLang="zh-TW" baseline="-25000" dirty="0" err="1"/>
-              <a:t>t</a:t>
-            </a:r>
-            <a:r>
-              <a:rPr kumimoji="1" lang="en-US" altLang="zh-TW" dirty="0"/>
-              <a:t> + b </a:t>
-            </a:r>
-            <a:r>
-              <a:rPr kumimoji="1" lang="en-US" altLang="zh-TW" dirty="0" err="1"/>
-              <a:t>y</a:t>
-            </a:r>
-            <a:r>
-              <a:rPr kumimoji="1" lang="en-US" altLang="zh-TW" baseline="-25000" dirty="0" err="1"/>
-              <a:t>t</a:t>
-            </a:r>
-            <a:r>
-              <a:rPr kumimoji="1" lang="en-US" altLang="zh-TW" dirty="0"/>
-              <a:t> = g</a:t>
-            </a:r>
-          </a:p>
-          <a:p>
-            <a:pPr marL="0" indent="0">
-              <a:buNone/>
-            </a:pPr>
-            <a:r>
-              <a:rPr kumimoji="1" lang="en-US" altLang="zh-TW" dirty="0" err="1"/>
-              <a:t>x</a:t>
-            </a:r>
-            <a:r>
-              <a:rPr kumimoji="1" lang="en-US" altLang="zh-TW" baseline="-25000" dirty="0" err="1"/>
-              <a:t>t</a:t>
-            </a:r>
-            <a:r>
-              <a:rPr kumimoji="1" lang="en-US" altLang="zh-TW" baseline="-25000" dirty="0"/>
-              <a:t> </a:t>
-            </a:r>
-            <a:r>
-              <a:rPr kumimoji="1" lang="en-US" altLang="zh-TW" dirty="0"/>
-              <a:t>= (y − ⌊b/a⌋⋅x)</a:t>
-            </a:r>
-          </a:p>
-          <a:p>
-            <a:pPr marL="0" indent="0">
-              <a:buNone/>
-            </a:pPr>
-            <a:r>
-              <a:rPr kumimoji="1" lang="en-US" altLang="zh-TW" dirty="0" err="1"/>
-              <a:t>y</a:t>
-            </a:r>
-            <a:r>
-              <a:rPr kumimoji="1" lang="en-US" altLang="zh-TW" baseline="-25000" dirty="0" err="1"/>
-              <a:t>t</a:t>
-            </a:r>
-            <a:r>
-              <a:rPr kumimoji="1" lang="en-US" altLang="zh-TW" baseline="-25000" dirty="0"/>
-              <a:t> </a:t>
-            </a:r>
-            <a:r>
-              <a:rPr kumimoji="1" lang="en-US" altLang="zh-TW" dirty="0"/>
-              <a:t>= x</a:t>
-            </a:r>
-          </a:p>
-          <a:p>
-            <a:pPr marL="0" indent="0" algn="ctr">
-              <a:buNone/>
-            </a:pPr>
-            <a:endParaRPr kumimoji="1" lang="en-US" altLang="zh-TW" dirty="0"/>
+            <a:pPr algn="ctr"/>
+            <a:endParaRPr kumimoji="1" lang="ja-JP" altLang="en-US"/>
           </a:p>
         </p:txBody>
       </p:sp>
     </p:spTree>
     <p:extLst>
       <p:ext uri="{BB962C8B-B14F-4D97-AF65-F5344CB8AC3E}">
-        <p14:creationId xmlns:p14="http://schemas.microsoft.com/office/powerpoint/2010/main" val="2312293447"/>
+        <p14:creationId xmlns:p14="http://schemas.microsoft.com/office/powerpoint/2010/main" val="1157726684"/>
       </p:ext>
     </p:extLst>
   </p:cSld>
@@ -13088,6 +14146,62 @@
                 <a:ea typeface="Menlo"/>
               </a:rPr>
               <a:t>;</a:t>
+            </a:r>
+            <a:r>
+              <a:rPr lang="zh-TW" altLang="en-US" dirty="0">
+                <a:solidFill>
+                  <a:srgbClr val="999999"/>
+                </a:solidFill>
+                <a:latin typeface="Consolas" panose="020B0609020204030204" pitchFamily="49" charset="0"/>
+                <a:ea typeface="Menlo"/>
+              </a:rPr>
+              <a:t> </a:t>
+            </a:r>
+            <a:r>
+              <a:rPr lang="en-US" altLang="zh-TW" dirty="0">
+                <a:solidFill>
+                  <a:srgbClr val="708090"/>
+                </a:solidFill>
+                <a:latin typeface="Consolas" panose="020B0609020204030204" pitchFamily="49" charset="0"/>
+              </a:rPr>
+              <a:t>//</a:t>
+            </a:r>
+            <a:r>
+              <a:rPr lang="zh-TW" altLang="en-US" dirty="0">
+                <a:solidFill>
+                  <a:srgbClr val="708090"/>
+                </a:solidFill>
+                <a:latin typeface="Consolas" panose="020B0609020204030204" pitchFamily="49" charset="0"/>
+              </a:rPr>
+              <a:t> </a:t>
+            </a:r>
+            <a:r>
+              <a:rPr lang="zh-TW" altLang="en-US" dirty="0">
+                <a:solidFill>
+                  <a:srgbClr val="708090"/>
+                </a:solidFill>
+                <a:latin typeface="Consolas" panose="020B0609020204030204" pitchFamily="49" charset="0"/>
+                <a:ea typeface="Menlo"/>
+              </a:rPr>
+              <a:t>更新</a:t>
+            </a:r>
+            <a:r>
+              <a:rPr lang="zh-TW" altLang="en-US" dirty="0">
+                <a:solidFill>
+                  <a:srgbClr val="708090"/>
+                </a:solidFill>
+                <a:latin typeface="Consolas" panose="020B0609020204030204" pitchFamily="49" charset="0"/>
+              </a:rPr>
+              <a:t> </a:t>
+            </a:r>
+            <a:r>
+              <a:rPr lang="en-US" altLang="zh-TW" dirty="0">
+                <a:solidFill>
+                  <a:srgbClr val="708090"/>
+                </a:solidFill>
+                <a:latin typeface="Consolas" panose="020B0609020204030204" pitchFamily="49" charset="0"/>
+              </a:rPr>
+              <a:t>x, y</a:t>
             </a:r>
             <a:br>
               <a:rPr lang="en-US" altLang="ja-JP" dirty="0">
@@ -13745,26 +14859,6 @@
               </a:rPr>
               <a:t>;</a:t>
             </a:r>
-            <a:r>
-              <a:rPr lang="ja-JP" altLang="ja-JP" dirty="0">
-                <a:solidFill>
-                  <a:srgbClr val="333333"/>
-                </a:solidFill>
-                <a:latin typeface="Consolas" panose="020B0609020204030204" pitchFamily="49" charset="0"/>
-                <a:ea typeface="Menlo"/>
-              </a:rPr>
-              <a:t> </a:t>
-            </a:r>
-            <a:r>
-              <a:rPr lang="ja-JP" altLang="ja-JP" dirty="0">
-                <a:solidFill>
-                  <a:srgbClr val="708090"/>
-                </a:solidFill>
-                <a:latin typeface="Consolas" panose="020B0609020204030204" pitchFamily="49" charset="0"/>
-                <a:ea typeface="Menlo"/>
-              </a:rPr>
-              <a:t>// x 為任意整數</a:t>
-            </a:r>
             <a:br>
               <a:rPr lang="en-US" altLang="ja-JP" dirty="0">
                 <a:solidFill>
@@ -15287,26 +16381,6 @@
               </a:rPr>
               <a:t>;</a:t>
             </a:r>
-            <a:r>
-              <a:rPr lang="ja-JP" altLang="ja-JP" dirty="0">
-                <a:solidFill>
-                  <a:srgbClr val="333333"/>
-                </a:solidFill>
-                <a:latin typeface="Consolas" panose="020B0609020204030204" pitchFamily="49" charset="0"/>
-                <a:ea typeface="Menlo"/>
-              </a:rPr>
-              <a:t> </a:t>
-            </a:r>
-            <a:r>
-              <a:rPr lang="ja-JP" altLang="ja-JP" dirty="0">
-                <a:solidFill>
-                  <a:srgbClr val="708090"/>
-                </a:solidFill>
-                <a:latin typeface="Consolas" panose="020B0609020204030204" pitchFamily="49" charset="0"/>
-                <a:ea typeface="Menlo"/>
-              </a:rPr>
-              <a:t>// x 為任意整數</a:t>
-            </a:r>
             <a:br>
               <a:rPr lang="en-US" altLang="ja-JP" dirty="0">
                 <a:solidFill>
@@ -16053,188 +17127,390 @@
           </a:p>
         </p:txBody>
       </p:sp>
-      <p:sp>
-        <p:nvSpPr>
-          <p:cNvPr id="3" name="內容版面配置區 2">
-            <a:extLst>
-              <a:ext uri="{FF2B5EF4-FFF2-40B4-BE49-F238E27FC236}">
-                <a16:creationId xmlns:a16="http://schemas.microsoft.com/office/drawing/2014/main" id="{F3171F7E-4F6B-4DDA-87B8-0779F10F59F3}"/>
-              </a:ext>
-            </a:extLst>
-          </p:cNvPr>
-          <p:cNvSpPr>
-            <a:spLocks noGrp="1"/>
-          </p:cNvSpPr>
-          <p:nvPr>
-            <p:ph idx="1"/>
-          </p:nvPr>
-        </p:nvSpPr>
-        <p:spPr/>
-        <p:txBody>
-          <a:bodyPr>
-            <a:normAutofit/>
-          </a:bodyPr>
-          <a:lstStyle/>
-          <a:p>
-            <a:pPr marL="0" indent="0">
-              <a:buNone/>
-            </a:pPr>
-            <a:r>
-              <a:rPr kumimoji="1" lang="zh-TW" altLang="en-US" dirty="0"/>
-              <a:t>考慮輾轉相除法，對</a:t>
-            </a:r>
-            <a:r>
-              <a:rPr kumimoji="1" lang="zh-TW" altLang="en-US" b="1" dirty="0"/>
-              <a:t>過程中</a:t>
-            </a:r>
-            <a:r>
-              <a:rPr kumimoji="1" lang="zh-TW" altLang="en-US" dirty="0"/>
-              <a:t>任意 </a:t>
-            </a:r>
-            <a:r>
-              <a:rPr kumimoji="1" lang="en-US" altLang="zh-TW" dirty="0"/>
-              <a:t>a, b </a:t>
-            </a:r>
-            <a:r>
-              <a:rPr kumimoji="1" lang="zh-TW" altLang="en-US" dirty="0"/>
-              <a:t>有</a:t>
-            </a:r>
-            <a:endParaRPr kumimoji="1" lang="en-US" altLang="zh-TW" dirty="0">
-              <a:solidFill>
-                <a:schemeClr val="bg1">
-                  <a:lumMod val="65000"/>
-                </a:schemeClr>
-              </a:solidFill>
-            </a:endParaRPr>
-          </a:p>
-          <a:p>
-            <a:pPr marL="0" indent="0">
-              <a:buNone/>
-            </a:pPr>
-            <a:endParaRPr kumimoji="1" lang="en-US" altLang="zh-TW" dirty="0"/>
-          </a:p>
-          <a:p>
-            <a:pPr marL="0" indent="0" algn="ctr">
-              <a:buNone/>
-            </a:pPr>
-            <a:r>
-              <a:rPr kumimoji="1" lang="en-US" altLang="zh-TW" dirty="0"/>
-              <a:t>g = b x + a (y − ⌊b/a⌋⋅x)</a:t>
-            </a:r>
-          </a:p>
-          <a:p>
-            <a:pPr marL="0" indent="0" algn="ctr">
-              <a:buNone/>
-            </a:pPr>
-            <a:endParaRPr kumimoji="1" lang="en-US" altLang="zh-TW" dirty="0"/>
-          </a:p>
-          <a:p>
-            <a:pPr marL="0" indent="0">
-              <a:buNone/>
-            </a:pPr>
-            <a:r>
-              <a:rPr kumimoji="1" lang="zh-TW" altLang="en-US" dirty="0"/>
-              <a:t>對於 </a:t>
-            </a:r>
-            <a:r>
-              <a:rPr kumimoji="1" lang="en-US" altLang="zh-TW" dirty="0"/>
-              <a:t>a </a:t>
-            </a:r>
-            <a:r>
-              <a:rPr kumimoji="1" lang="zh-TW" altLang="en-US" dirty="0"/>
-              <a:t>與 </a:t>
-            </a:r>
-            <a:r>
-              <a:rPr kumimoji="1" lang="en-US" altLang="zh-TW" dirty="0"/>
-              <a:t>b </a:t>
-            </a:r>
-            <a:r>
-              <a:rPr kumimoji="1" lang="zh-TW" altLang="en-US" dirty="0"/>
-              <a:t>的貝祖等式 </a:t>
-            </a:r>
-            <a:r>
-              <a:rPr kumimoji="1" lang="en-US" altLang="zh-TW" dirty="0"/>
-              <a:t>a </a:t>
-            </a:r>
-            <a:r>
-              <a:rPr kumimoji="1" lang="en-US" altLang="zh-TW" dirty="0" err="1"/>
-              <a:t>x</a:t>
-            </a:r>
-            <a:r>
-              <a:rPr kumimoji="1" lang="en-US" altLang="zh-TW" baseline="-25000" dirty="0" err="1"/>
-              <a:t>t</a:t>
-            </a:r>
-            <a:r>
-              <a:rPr kumimoji="1" lang="en-US" altLang="zh-TW" dirty="0"/>
-              <a:t> + b </a:t>
-            </a:r>
-            <a:r>
-              <a:rPr kumimoji="1" lang="en-US" altLang="zh-TW" dirty="0" err="1"/>
-              <a:t>y</a:t>
-            </a:r>
-            <a:r>
-              <a:rPr kumimoji="1" lang="en-US" altLang="zh-TW" baseline="-25000" dirty="0" err="1"/>
-              <a:t>t</a:t>
-            </a:r>
-            <a:r>
-              <a:rPr kumimoji="1" lang="en-US" altLang="zh-TW" dirty="0"/>
-              <a:t> = g</a:t>
-            </a:r>
-          </a:p>
-          <a:p>
-            <a:pPr marL="0" indent="0">
-              <a:buNone/>
-            </a:pPr>
-            <a:r>
-              <a:rPr kumimoji="1" lang="en-US" altLang="zh-TW" dirty="0" err="1"/>
-              <a:t>x</a:t>
-            </a:r>
-            <a:r>
-              <a:rPr kumimoji="1" lang="en-US" altLang="zh-TW" baseline="-25000" dirty="0" err="1"/>
-              <a:t>t</a:t>
-            </a:r>
-            <a:r>
-              <a:rPr kumimoji="1" lang="en-US" altLang="zh-TW" baseline="-25000" dirty="0"/>
-              <a:t> </a:t>
-            </a:r>
-            <a:r>
-              <a:rPr kumimoji="1" lang="en-US" altLang="zh-TW" dirty="0"/>
-              <a:t>= (y − ⌊b/a⌋⋅x)</a:t>
-            </a:r>
-          </a:p>
-          <a:p>
-            <a:pPr marL="0" indent="0">
-              <a:buNone/>
-            </a:pPr>
-            <a:r>
-              <a:rPr kumimoji="1" lang="en-US" altLang="zh-TW" dirty="0" err="1"/>
-              <a:t>y</a:t>
-            </a:r>
-            <a:r>
-              <a:rPr kumimoji="1" lang="en-US" altLang="zh-TW" baseline="-25000" dirty="0" err="1"/>
-              <a:t>t</a:t>
-            </a:r>
-            <a:r>
-              <a:rPr kumimoji="1" lang="en-US" altLang="zh-TW" baseline="-25000" dirty="0"/>
-              <a:t> </a:t>
-            </a:r>
-            <a:r>
-              <a:rPr kumimoji="1" lang="en-US" altLang="zh-TW" dirty="0"/>
-              <a:t>= x</a:t>
-            </a:r>
-          </a:p>
-          <a:p>
-            <a:pPr marL="0" indent="0" algn="ctr">
-              <a:buNone/>
-            </a:pPr>
-            <a:endParaRPr kumimoji="1" lang="en-US" altLang="zh-TW" dirty="0"/>
-          </a:p>
-        </p:txBody>
-      </p:sp>
+      <mc:AlternateContent xmlns:mc="http://schemas.openxmlformats.org/markup-compatibility/2006">
+        <mc:Choice xmlns:a14="http://schemas.microsoft.com/office/drawing/2010/main" Requires="a14">
+          <p:sp>
+            <p:nvSpPr>
+              <p:cNvPr id="3" name="內容版面配置區 2">
+                <a:extLst>
+                  <a:ext uri="{FF2B5EF4-FFF2-40B4-BE49-F238E27FC236}">
+                    <a16:creationId xmlns:a16="http://schemas.microsoft.com/office/drawing/2014/main" id="{F3171F7E-4F6B-4DDA-87B8-0779F10F59F3}"/>
+                  </a:ext>
+                </a:extLst>
+              </p:cNvPr>
+              <p:cNvSpPr>
+                <a:spLocks noGrp="1"/>
+              </p:cNvSpPr>
+              <p:nvPr>
+                <p:ph idx="1"/>
+              </p:nvPr>
+            </p:nvSpPr>
+            <p:spPr/>
+            <p:txBody>
+              <a:bodyPr>
+                <a:normAutofit/>
+              </a:bodyPr>
+              <a:lstStyle/>
+              <a:p>
+                <a:pPr marL="0" indent="0">
+                  <a:buNone/>
+                </a:pPr>
+                <a:r>
+                  <a:rPr kumimoji="1" lang="zh-TW" altLang="en-US" dirty="0"/>
+                  <a:t>考慮輾轉相除法，對</a:t>
+                </a:r>
+                <a:r>
+                  <a:rPr kumimoji="1" lang="zh-TW" altLang="en-US" b="1" dirty="0"/>
+                  <a:t>過程中</a:t>
+                </a:r>
+                <a:r>
+                  <a:rPr kumimoji="1" lang="zh-TW" altLang="en-US" dirty="0"/>
+                  <a:t>任意 </a:t>
+                </a:r>
+                <a:r>
+                  <a:rPr kumimoji="1" lang="en-US" altLang="zh-TW" dirty="0"/>
+                  <a:t>a, b </a:t>
+                </a:r>
+                <a:r>
+                  <a:rPr kumimoji="1" lang="zh-TW" altLang="en-US" dirty="0"/>
+                  <a:t>有</a:t>
+                </a:r>
+                <a:endParaRPr kumimoji="1" lang="en-US" altLang="zh-TW" dirty="0">
+                  <a:solidFill>
+                    <a:schemeClr val="bg1">
+                      <a:lumMod val="65000"/>
+                    </a:schemeClr>
+                  </a:solidFill>
+                </a:endParaRPr>
+              </a:p>
+              <a:p>
+                <a:pPr marL="0" indent="0">
+                  <a:buNone/>
+                </a:pPr>
+                <a:endParaRPr kumimoji="1" lang="en-US" altLang="zh-TW" dirty="0"/>
+              </a:p>
+              <a:p>
+                <a:pPr marL="0" indent="0" algn="ctr">
+                  <a:buNone/>
+                </a:pPr>
+                <a:r>
+                  <a:rPr kumimoji="1" lang="en-US" altLang="zh-TW" dirty="0"/>
+                  <a:t>g = a </a:t>
+                </a:r>
+                <a:r>
+                  <a:rPr kumimoji="1" lang="en-US" altLang="zh-TW" dirty="0" err="1"/>
+                  <a:t>x</a:t>
+                </a:r>
+                <a:r>
+                  <a:rPr kumimoji="1" lang="en-US" altLang="zh-TW" baseline="-25000" dirty="0" err="1"/>
+                  <a:t>t</a:t>
+                </a:r>
+                <a:r>
+                  <a:rPr kumimoji="1" lang="en-US" altLang="zh-TW" dirty="0"/>
+                  <a:t> + b </a:t>
+                </a:r>
+                <a:r>
+                  <a:rPr kumimoji="1" lang="en-US" altLang="zh-TW" dirty="0" err="1"/>
+                  <a:t>y</a:t>
+                </a:r>
+                <a:r>
+                  <a:rPr kumimoji="1" lang="en-US" altLang="zh-TW" baseline="-25000" dirty="0" err="1"/>
+                  <a:t>t</a:t>
+                </a:r>
+                <a:r>
+                  <a:rPr kumimoji="1" lang="zh-TW" altLang="en-US" baseline="-25000" dirty="0"/>
+                  <a:t> </a:t>
+                </a:r>
+                <a14:m>
+                  <m:oMath xmlns:m="http://schemas.openxmlformats.org/officeDocument/2006/math">
+                    <m:r>
+                      <a:rPr kumimoji="1" lang="zh-TW" altLang="en-US" i="1" baseline="-25000" dirty="0">
+                        <a:latin typeface="Cambria Math" panose="02040503050406030204" pitchFamily="18" charset="0"/>
+                      </a:rPr>
+                      <m:t> </m:t>
+                    </m:r>
+                    <m:r>
+                      <a:rPr kumimoji="1" lang="zh-TW" altLang="en-US" dirty="0">
+                        <a:latin typeface="Cambria Math" panose="02040503050406030204" pitchFamily="18" charset="0"/>
+                      </a:rPr>
+                      <m:t>其中</m:t>
+                    </m:r>
+                    <m:r>
+                      <a:rPr kumimoji="1" lang="zh-TW" altLang="en-US" i="1" smtClean="0">
+                        <a:latin typeface="Cambria Math" panose="02040503050406030204" pitchFamily="18" charset="0"/>
+                      </a:rPr>
+                      <m:t> </m:t>
+                    </m:r>
+                    <m:d>
+                      <m:dPr>
+                        <m:begChr m:val="{"/>
+                        <m:endChr m:val=""/>
+                        <m:ctrlPr>
+                          <a:rPr kumimoji="1" lang="en-US" altLang="zh-TW" smtClean="0">
+                            <a:latin typeface="Cambria Math" panose="02040503050406030204" pitchFamily="18" charset="0"/>
+                          </a:rPr>
+                        </m:ctrlPr>
+                      </m:dPr>
+                      <m:e>
+                        <m:m>
+                          <m:mPr>
+                            <m:plcHide m:val="on"/>
+                            <m:mcs>
+                              <m:mc>
+                                <m:mcPr>
+                                  <m:count m:val="1"/>
+                                  <m:mcJc m:val="center"/>
+                                </m:mcPr>
+                              </m:mc>
+                            </m:mcs>
+                            <m:ctrlPr>
+                              <a:rPr kumimoji="1" lang="en-US" altLang="zh-TW" i="1" smtClean="0">
+                                <a:latin typeface="Cambria Math" panose="02040503050406030204" pitchFamily="18" charset="0"/>
+                              </a:rPr>
+                            </m:ctrlPr>
+                          </m:mPr>
+                          <m:mr>
+                            <m:e>
+                              <m:eqArr>
+                                <m:eqArrPr>
+                                  <m:ctrlPr>
+                                    <a:rPr kumimoji="1" lang="en-US" altLang="zh-TW" i="1" smtClean="0">
+                                      <a:latin typeface="Cambria Math" panose="02040503050406030204" pitchFamily="18" charset="0"/>
+                                    </a:rPr>
+                                  </m:ctrlPr>
+                                </m:eqArrPr>
+                                <m:e>
+                                  <m:r>
+                                    <a:rPr kumimoji="1" lang="en-US" altLang="zh-TW" i="1">
+                                      <a:latin typeface="Cambria Math" panose="02040503050406030204" pitchFamily="18" charset="0"/>
+                                    </a:rPr>
+                                    <m:t>&amp;</m:t>
+                                  </m:r>
+                                  <m:r>
+                                    <m:rPr>
+                                      <m:nor/>
+                                    </m:rPr>
+                                    <a:rPr kumimoji="1" lang="en-US" altLang="zh-TW" dirty="0"/>
+                                    <m:t>x</m:t>
+                                  </m:r>
+                                  <m:r>
+                                    <m:rPr>
+                                      <m:nor/>
+                                    </m:rPr>
+                                    <a:rPr kumimoji="1" lang="en-US" altLang="zh-TW" baseline="-25000" dirty="0"/>
+                                    <m:t>t</m:t>
+                                  </m:r>
+                                  <m:r>
+                                    <m:rPr>
+                                      <m:nor/>
+                                    </m:rPr>
+                                    <a:rPr kumimoji="1" lang="en-US" altLang="zh-TW" baseline="-25000" dirty="0"/>
+                                    <m:t> = </m:t>
+                                  </m:r>
+                                  <m:r>
+                                    <m:rPr>
+                                      <m:nor/>
+                                    </m:rPr>
+                                    <a:rPr kumimoji="1" lang="en-US" altLang="zh-TW" dirty="0"/>
+                                    <m:t>(</m:t>
+                                  </m:r>
+                                  <m:r>
+                                    <m:rPr>
+                                      <m:nor/>
+                                    </m:rPr>
+                                    <a:rPr kumimoji="1" lang="en-US" altLang="zh-TW" dirty="0"/>
+                                    <m:t>y</m:t>
+                                  </m:r>
+                                  <m:r>
+                                    <m:rPr>
+                                      <m:nor/>
+                                    </m:rPr>
+                                    <a:rPr kumimoji="1" lang="en-US" altLang="zh-TW" dirty="0"/>
+                                    <m:t> </m:t>
+                                  </m:r>
+                                  <m:r>
+                                    <m:rPr>
+                                      <m:nor/>
+                                    </m:rPr>
+                                    <a:rPr kumimoji="1" lang="en-US" altLang="zh-TW" i="1" dirty="0"/>
+                                    <m:t>-</m:t>
+                                  </m:r>
+                                  <m:r>
+                                    <m:rPr>
+                                      <m:nor/>
+                                    </m:rPr>
+                                    <a:rPr kumimoji="1" lang="en-US" altLang="zh-TW" dirty="0"/>
+                                    <m:t> </m:t>
+                                  </m:r>
+                                  <m:d>
+                                    <m:dPr>
+                                      <m:begChr m:val="⌊"/>
+                                      <m:endChr m:val="⌋"/>
+                                      <m:ctrlPr>
+                                        <a:rPr kumimoji="1" lang="en-US" altLang="zh-TW" i="1" dirty="0">
+                                          <a:latin typeface="Cambria Math" panose="02040503050406030204" pitchFamily="18" charset="0"/>
+                                        </a:rPr>
+                                      </m:ctrlPr>
+                                    </m:dPr>
+                                    <m:e>
+                                      <m:f>
+                                        <m:fPr>
+                                          <m:ctrlPr>
+                                            <a:rPr kumimoji="1" lang="en-US" altLang="zh-TW" i="1" dirty="0">
+                                              <a:latin typeface="Cambria Math" panose="02040503050406030204" pitchFamily="18" charset="0"/>
+                                            </a:rPr>
+                                          </m:ctrlPr>
+                                        </m:fPr>
+                                        <m:num>
+                                          <m:r>
+                                            <m:rPr>
+                                              <m:sty m:val="p"/>
+                                            </m:rPr>
+                                            <a:rPr kumimoji="1" lang="en-US" altLang="zh-TW" dirty="0">
+                                              <a:latin typeface="Cambria Math" panose="02040503050406030204" pitchFamily="18" charset="0"/>
+                                            </a:rPr>
+                                            <m:t>b</m:t>
+                                          </m:r>
+                                        </m:num>
+                                        <m:den>
+                                          <m:r>
+                                            <m:rPr>
+                                              <m:sty m:val="p"/>
+                                            </m:rPr>
+                                            <a:rPr kumimoji="1" lang="en-US" altLang="zh-TW" dirty="0">
+                                              <a:latin typeface="Cambria Math" panose="02040503050406030204" pitchFamily="18" charset="0"/>
+                                            </a:rPr>
+                                            <m:t>a</m:t>
+                                          </m:r>
+                                        </m:den>
+                                      </m:f>
+                                    </m:e>
+                                  </m:d>
+                                  <m:r>
+                                    <m:rPr>
+                                      <m:nor/>
+                                    </m:rPr>
+                                    <a:rPr kumimoji="1" lang="en-US" altLang="zh-TW" dirty="0"/>
+                                    <m:t>⋅</m:t>
+                                  </m:r>
+                                  <m:r>
+                                    <m:rPr>
+                                      <m:nor/>
+                                    </m:rPr>
+                                    <a:rPr kumimoji="1" lang="en-US" altLang="zh-TW" dirty="0"/>
+                                    <m:t>x</m:t>
+                                  </m:r>
+                                  <m:r>
+                                    <m:rPr>
+                                      <m:nor/>
+                                    </m:rPr>
+                                    <a:rPr kumimoji="1" lang="en-US" altLang="zh-TW" dirty="0"/>
+                                    <m:t>) </m:t>
+                                  </m:r>
+                                </m:e>
+                                <m:e>
+                                  <m:r>
+                                    <a:rPr kumimoji="1" lang="en-US" altLang="zh-TW" i="1">
+                                      <a:latin typeface="Cambria Math" panose="02040503050406030204" pitchFamily="18" charset="0"/>
+                                    </a:rPr>
+                                    <m:t>&amp;</m:t>
+                                  </m:r>
+                                  <m:r>
+                                    <m:rPr>
+                                      <m:nor/>
+                                    </m:rPr>
+                                    <a:rPr kumimoji="1" lang="en-US" altLang="zh-TW" dirty="0"/>
+                                    <m:t>y</m:t>
+                                  </m:r>
+                                  <m:r>
+                                    <m:rPr>
+                                      <m:nor/>
+                                    </m:rPr>
+                                    <a:rPr kumimoji="1" lang="en-US" altLang="zh-TW" baseline="-25000" dirty="0"/>
+                                    <m:t>t</m:t>
+                                  </m:r>
+                                  <m:r>
+                                    <m:rPr>
+                                      <m:nor/>
+                                    </m:rPr>
+                                    <a:rPr kumimoji="1" lang="en-US" altLang="zh-TW" baseline="-25000" dirty="0"/>
+                                    <m:t> = </m:t>
+                                  </m:r>
+                                  <m:r>
+                                    <m:rPr>
+                                      <m:nor/>
+                                    </m:rPr>
+                                    <a:rPr kumimoji="1" lang="en-US" altLang="zh-TW" dirty="0"/>
+                                    <m:t>x</m:t>
+                                  </m:r>
+                                  <m:r>
+                                    <m:rPr>
+                                      <m:nor/>
+                                    </m:rPr>
+                                    <a:rPr kumimoji="1" lang="en-US" altLang="zh-TW" dirty="0"/>
+                                    <m:t> </m:t>
+                                  </m:r>
+                                </m:e>
+                              </m:eqArr>
+                            </m:e>
+                          </m:mr>
+                          <m:mr>
+                            <m:e/>
+                          </m:mr>
+                        </m:m>
+                      </m:e>
+                    </m:d>
+                  </m:oMath>
+                </a14:m>
+                <a:endParaRPr kumimoji="1" lang="en-US" altLang="zh-TW" dirty="0"/>
+              </a:p>
+            </p:txBody>
+          </p:sp>
+        </mc:Choice>
+        <mc:Fallback>
+          <p:sp>
+            <p:nvSpPr>
+              <p:cNvPr id="3" name="內容版面配置區 2">
+                <a:extLst>
+                  <a:ext uri="{FF2B5EF4-FFF2-40B4-BE49-F238E27FC236}">
+                    <a16:creationId xmlns:a16="http://schemas.microsoft.com/office/drawing/2014/main" id="{F3171F7E-4F6B-4DDA-87B8-0779F10F59F3}"/>
+                  </a:ext>
+                </a:extLst>
+              </p:cNvPr>
+              <p:cNvSpPr>
+                <a:spLocks noGrp="1" noRot="1" noChangeAspect="1" noMove="1" noResize="1" noEditPoints="1" noAdjustHandles="1" noChangeArrowheads="1" noChangeShapeType="1" noTextEdit="1"/>
+              </p:cNvSpPr>
+              <p:nvPr>
+                <p:ph idx="1"/>
+              </p:nvPr>
+            </p:nvSpPr>
+            <p:spPr>
+              <a:blipFill>
+                <a:blip r:embed="rId2"/>
+                <a:stretch>
+                  <a:fillRect l="-1797" t="-3361"/>
+                </a:stretch>
+              </a:blipFill>
+            </p:spPr>
+            <p:txBody>
+              <a:bodyPr/>
+              <a:lstStyle/>
+              <a:p>
+                <a:r>
+                  <a:rPr lang="ja-JP" altLang="en-US">
+                    <a:noFill/>
+                  </a:rPr>
+                  <a:t> </a:t>
+                </a:r>
+              </a:p>
+            </p:txBody>
+          </p:sp>
+        </mc:Fallback>
+      </mc:AlternateContent>
     </p:spTree>
     <p:extLst>
       <p:ext uri="{BB962C8B-B14F-4D97-AF65-F5344CB8AC3E}">
-        <p14:creationId xmlns:p14="http://schemas.microsoft.com/office/powerpoint/2010/main" val="1391918662"/>
+        <p14:creationId xmlns:p14="http://schemas.microsoft.com/office/powerpoint/2010/main" val="4163555056"/>
       </p:ext>
     </p:extLst>
   </p:cSld>

</xml_diff>